<commit_message>
Aktualizacja terminow, zmiana zasad dostarczenia zadania dbclient
</commit_message>
<xml_diff>
--- a/WDSR - ćwiczenie 5.pptx
+++ b/WDSR - ćwiczenie 5.pptx
@@ -263,7 +263,7 @@
             <a:fld id="{C4843D26-F355-3844-A4EF-19D4FD875597}" type="datetimeFigureOut">
               <a:rPr lang="de-DE" smtClean="0"/>
               <a:pPr/>
-              <a:t>06.05.2017</a:t>
+              <a:t>09.05.2017</a:t>
             </a:fld>
             <a:endParaRPr lang="de-DE" dirty="0"/>
           </a:p>
@@ -431,7 +431,7 @@
             <a:fld id="{8E2CFE12-C1FB-D740-8B6C-AFB72D5D4002}" type="datetimeFigureOut">
               <a:rPr lang="de-DE" smtClean="0"/>
               <a:pPr/>
-              <a:t>06.05.2017</a:t>
+              <a:t>09.05.2017</a:t>
             </a:fld>
             <a:endParaRPr lang="de-DE" dirty="0"/>
           </a:p>
@@ -6021,37 +6021,20 @@
           <a:p>
             <a:r>
               <a:rPr lang="pl-PL" dirty="0" smtClean="0"/>
-              <a:t>Materiały: </a:t>
-            </a:r>
-            <a:r>
-              <a:rPr lang="pl-PL" dirty="0" smtClean="0"/>
-              <a:t>Marek </a:t>
-            </a:r>
-            <a:r>
-              <a:rPr lang="pl-PL" dirty="0" smtClean="0"/>
-              <a:t>Strejczek</a:t>
+              <a:t>Materiały: Marek Strejczek</a:t>
             </a:r>
             <a:endParaRPr lang="de-DE" dirty="0" smtClean="0"/>
           </a:p>
           <a:p>
             <a:r>
               <a:rPr lang="pl-PL" dirty="0" smtClean="0"/>
-              <a:t>Lato </a:t>
-            </a:r>
-            <a:r>
-              <a:rPr lang="pl-PL" dirty="0" smtClean="0"/>
-              <a:t>2017</a:t>
-            </a:r>
-            <a:endParaRPr lang="pl-PL" dirty="0" smtClean="0"/>
-          </a:p>
-          <a:p>
-            <a:r>
-              <a:rPr lang="pl-PL" dirty="0" smtClean="0"/>
-              <a:t>Wersja </a:t>
-            </a:r>
-            <a:r>
-              <a:rPr lang="pl-PL" dirty="0" smtClean="0"/>
-              <a:t>2.0</a:t>
+              <a:t>Lato 2017</a:t>
+            </a:r>
+          </a:p>
+          <a:p>
+            <a:r>
+              <a:rPr lang="pl-PL" dirty="0" smtClean="0"/>
+              <a:t>Wersja 2.0</a:t>
             </a:r>
             <a:endParaRPr lang="de-DE" dirty="0"/>
           </a:p>
@@ -9328,33 +9311,12 @@
           <a:p>
             <a:pPr lvl="1"/>
             <a:r>
-              <a:rPr lang="pl-PL" dirty="0">
-                <a:hlinkClick r:id="rId3"/>
-              </a:rPr>
-              <a:t>https://</a:t>
-            </a:r>
-            <a:r>
               <a:rPr lang="pl-PL" dirty="0" smtClean="0">
                 <a:hlinkClick r:id="rId3"/>
               </a:rPr>
-              <a:t>github.com/wdsr/exercise5</a:t>
+              <a:t>https://github.com/m-kolodziejski/exercise5</a:t>
             </a:r>
             <a:endParaRPr lang="pl-PL" dirty="0" smtClean="0"/>
-          </a:p>
-          <a:p>
-            <a:pPr lvl="1"/>
-            <a:r>
-              <a:rPr lang="pl-PL" dirty="0" smtClean="0"/>
-              <a:t>Tym razem nie rób </a:t>
-            </a:r>
-            <a:r>
-              <a:rPr lang="pl-PL" dirty="0" err="1" smtClean="0"/>
-              <a:t>forka</a:t>
-            </a:r>
-            <a:r>
-              <a:rPr lang="pl-PL" dirty="0" smtClean="0"/>
-              <a:t>!</a:t>
-            </a:r>
           </a:p>
           <a:p>
             <a:endParaRPr lang="pl-PL" dirty="0" smtClean="0"/>
@@ -9549,39 +9511,26 @@
                                   </p:childTnLst>
                                 </p:cTn>
                               </p:par>
+                            </p:childTnLst>
+                          </p:cTn>
+                        </p:par>
+                      </p:childTnLst>
+                    </p:cTn>
+                  </p:par>
+                  <p:par>
+                    <p:cTn id="7" fill="hold">
+                      <p:stCondLst>
+                        <p:cond delay="indefinite"/>
+                      </p:stCondLst>
+                      <p:childTnLst>
+                        <p:par>
+                          <p:cTn id="8" fill="hold">
+                            <p:stCondLst>
+                              <p:cond delay="0"/>
+                            </p:stCondLst>
+                            <p:childTnLst>
                               <p:par>
-                                <p:cTn id="7" presetID="1" presetClass="entr" presetSubtype="0" fill="hold" nodeType="withEffect">
-                                  <p:stCondLst>
-                                    <p:cond delay="0"/>
-                                  </p:stCondLst>
-                                  <p:childTnLst>
-                                    <p:set>
-                                      <p:cBhvr>
-                                        <p:cTn id="8" dur="1" fill="hold">
-                                          <p:stCondLst>
-                                            <p:cond delay="0"/>
-                                          </p:stCondLst>
-                                        </p:cTn>
-                                        <p:tgtEl>
-                                          <p:spTgt spid="6">
-                                            <p:txEl>
-                                              <p:pRg st="1" end="1"/>
-                                            </p:txEl>
-                                          </p:spTgt>
-                                        </p:tgtEl>
-                                        <p:attrNameLst>
-                                          <p:attrName>style.visibility</p:attrName>
-                                        </p:attrNameLst>
-                                      </p:cBhvr>
-                                      <p:to>
-                                        <p:strVal val="visible"/>
-                                      </p:to>
-                                    </p:set>
-                                  </p:childTnLst>
-                                </p:cTn>
-                              </p:par>
-                              <p:par>
-                                <p:cTn id="9" presetID="1" presetClass="entr" presetSubtype="0" fill="hold" nodeType="withEffect">
+                                <p:cTn id="9" presetID="1" presetClass="entr" presetSubtype="0" fill="hold" nodeType="clickEffect">
                                   <p:stCondLst>
                                     <p:cond delay="0"/>
                                   </p:stCondLst>
@@ -9596,7 +9545,7 @@
                                         <p:tgtEl>
                                           <p:spTgt spid="6">
                                             <p:txEl>
-                                              <p:pRg st="2" end="2"/>
+                                              <p:pRg st="1" end="1"/>
                                             </p:txEl>
                                           </p:spTgt>
                                         </p:tgtEl>
@@ -9645,7 +9594,7 @@
                                         <p:tgtEl>
                                           <p:spTgt spid="6">
                                             <p:txEl>
-                                              <p:pRg st="4" end="4"/>
+                                              <p:pRg st="3" end="3"/>
                                             </p:txEl>
                                           </p:spTgt>
                                         </p:tgtEl>
@@ -9676,7 +9625,7 @@
                                         <p:tgtEl>
                                           <p:spTgt spid="6">
                                             <p:txEl>
-                                              <p:pRg st="5" end="5"/>
+                                              <p:pRg st="4" end="4"/>
                                             </p:txEl>
                                           </p:spTgt>
                                         </p:tgtEl>
@@ -9707,7 +9656,7 @@
                                         <p:tgtEl>
                                           <p:spTgt spid="6">
                                             <p:txEl>
-                                              <p:pRg st="6" end="6"/>
+                                              <p:pRg st="5" end="5"/>
                                             </p:txEl>
                                           </p:spTgt>
                                         </p:tgtEl>
@@ -9738,7 +9687,7 @@
                                         <p:tgtEl>
                                           <p:spTgt spid="6">
                                             <p:txEl>
-                                              <p:pRg st="7" end="7"/>
+                                              <p:pRg st="6" end="6"/>
                                             </p:txEl>
                                           </p:spTgt>
                                         </p:tgtEl>
@@ -9769,7 +9718,7 @@
                                         <p:tgtEl>
                                           <p:spTgt spid="6">
                                             <p:txEl>
-                                              <p:pRg st="8" end="8"/>
+                                              <p:pRg st="7" end="7"/>
                                             </p:txEl>
                                           </p:spTgt>
                                         </p:tgtEl>
@@ -9818,7 +9767,7 @@
                                         <p:tgtEl>
                                           <p:spTgt spid="6">
                                             <p:txEl>
-                                              <p:pRg st="10" end="10"/>
+                                              <p:pRg st="9" end="9"/>
                                             </p:txEl>
                                           </p:spTgt>
                                         </p:tgtEl>
@@ -9912,32 +9861,15 @@
             <a:pPr lvl="1"/>
             <a:r>
               <a:rPr lang="pl-PL" dirty="0" smtClean="0"/>
-              <a:t>Utwórz repozytorium exercise5 na GitHubie. Repozytorium musi być dostępne pod adresem:</a:t>
-            </a:r>
-          </a:p>
-          <a:p>
-            <a:pPr lvl="2"/>
-            <a:r>
-              <a:rPr lang="pl-PL" dirty="0" smtClean="0">
-                <a:hlinkClick r:id="rId3"/>
-              </a:rPr>
-              <a:t>https://github.com/&lt;username&gt;/exercise5</a:t>
-            </a:r>
-            <a:endParaRPr lang="pl-PL" dirty="0" smtClean="0"/>
-          </a:p>
-          <a:p>
-            <a:pPr lvl="1"/>
-            <a:r>
-              <a:rPr lang="pl-PL" dirty="0" smtClean="0"/>
-              <a:t>W domyślnym </a:t>
+              <a:t>Utwórz </a:t>
             </a:r>
             <a:r>
               <a:rPr lang="pl-PL" dirty="0" err="1" smtClean="0"/>
-              <a:t>branch’u</a:t>
-            </a:r>
-            <a:r>
-              <a:rPr lang="pl-PL" dirty="0" smtClean="0"/>
-              <a:t> (master) utwórz katalog </a:t>
+              <a:t>branch</a:t>
+            </a:r>
+            <a:r>
+              <a:rPr lang="pl-PL" dirty="0" smtClean="0"/>
+              <a:t> </a:t>
             </a:r>
             <a:r>
               <a:rPr lang="pl-PL" dirty="0" err="1" smtClean="0"/>
@@ -10425,15 +10357,33 @@
                                   </p:childTnLst>
                                 </p:cTn>
                               </p:par>
+                            </p:childTnLst>
+                          </p:cTn>
+                        </p:par>
+                      </p:childTnLst>
+                    </p:cTn>
+                  </p:par>
+                  <p:par>
+                    <p:cTn id="9" fill="hold">
+                      <p:stCondLst>
+                        <p:cond delay="indefinite"/>
+                      </p:stCondLst>
+                      <p:childTnLst>
+                        <p:par>
+                          <p:cTn id="10" fill="hold">
+                            <p:stCondLst>
+                              <p:cond delay="0"/>
+                            </p:stCondLst>
+                            <p:childTnLst>
                               <p:par>
-                                <p:cTn id="9" presetID="1" presetClass="entr" presetSubtype="0" fill="hold" nodeType="withEffect">
+                                <p:cTn id="11" presetID="1" presetClass="entr" presetSubtype="0" fill="hold" nodeType="clickEffect">
                                   <p:stCondLst>
                                     <p:cond delay="0"/>
                                   </p:stCondLst>
                                   <p:childTnLst>
                                     <p:set>
                                       <p:cBhvr>
-                                        <p:cTn id="10" dur="1" fill="hold">
+                                        <p:cTn id="12" dur="1" fill="hold">
                                           <p:stCondLst>
                                             <p:cond delay="0"/>
                                           </p:stCondLst>
@@ -10456,26 +10406,8 @@
                                   </p:childTnLst>
                                 </p:cTn>
                               </p:par>
-                            </p:childTnLst>
-                          </p:cTn>
-                        </p:par>
-                      </p:childTnLst>
-                    </p:cTn>
-                  </p:par>
-                  <p:par>
-                    <p:cTn id="11" fill="hold">
-                      <p:stCondLst>
-                        <p:cond delay="indefinite"/>
-                      </p:stCondLst>
-                      <p:childTnLst>
-                        <p:par>
-                          <p:cTn id="12" fill="hold">
-                            <p:stCondLst>
-                              <p:cond delay="0"/>
-                            </p:stCondLst>
-                            <p:childTnLst>
                               <p:par>
-                                <p:cTn id="13" presetID="1" presetClass="entr" presetSubtype="0" fill="hold" nodeType="clickEffect">
+                                <p:cTn id="13" presetID="1" presetClass="entr" presetSubtype="0" fill="hold" nodeType="withEffect">
                                   <p:stCondLst>
                                     <p:cond delay="0"/>
                                   </p:stCondLst>
@@ -10505,33 +10437,15 @@
                                   </p:childTnLst>
                                 </p:cTn>
                               </p:par>
-                            </p:childTnLst>
-                          </p:cTn>
-                        </p:par>
-                      </p:childTnLst>
-                    </p:cTn>
-                  </p:par>
-                  <p:par>
-                    <p:cTn id="15" fill="hold">
-                      <p:stCondLst>
-                        <p:cond delay="indefinite"/>
-                      </p:stCondLst>
-                      <p:childTnLst>
-                        <p:par>
-                          <p:cTn id="16" fill="hold">
-                            <p:stCondLst>
-                              <p:cond delay="0"/>
-                            </p:stCondLst>
-                            <p:childTnLst>
                               <p:par>
-                                <p:cTn id="17" presetID="1" presetClass="entr" presetSubtype="0" fill="hold" nodeType="clickEffect">
+                                <p:cTn id="15" presetID="1" presetClass="entr" presetSubtype="0" fill="hold" nodeType="withEffect">
                                   <p:stCondLst>
                                     <p:cond delay="0"/>
                                   </p:stCondLst>
                                   <p:childTnLst>
                                     <p:set>
                                       <p:cBhvr>
-                                        <p:cTn id="18" dur="1" fill="hold">
+                                        <p:cTn id="16" dur="1" fill="hold">
                                           <p:stCondLst>
                                             <p:cond delay="0"/>
                                           </p:stCondLst>
@@ -10540,68 +10454,6 @@
                                           <p:spTgt spid="6">
                                             <p:txEl>
                                               <p:pRg st="4" end="4"/>
-                                            </p:txEl>
-                                          </p:spTgt>
-                                        </p:tgtEl>
-                                        <p:attrNameLst>
-                                          <p:attrName>style.visibility</p:attrName>
-                                        </p:attrNameLst>
-                                      </p:cBhvr>
-                                      <p:to>
-                                        <p:strVal val="visible"/>
-                                      </p:to>
-                                    </p:set>
-                                  </p:childTnLst>
-                                </p:cTn>
-                              </p:par>
-                              <p:par>
-                                <p:cTn id="19" presetID="1" presetClass="entr" presetSubtype="0" fill="hold" nodeType="withEffect">
-                                  <p:stCondLst>
-                                    <p:cond delay="0"/>
-                                  </p:stCondLst>
-                                  <p:childTnLst>
-                                    <p:set>
-                                      <p:cBhvr>
-                                        <p:cTn id="20" dur="1" fill="hold">
-                                          <p:stCondLst>
-                                            <p:cond delay="0"/>
-                                          </p:stCondLst>
-                                        </p:cTn>
-                                        <p:tgtEl>
-                                          <p:spTgt spid="6">
-                                            <p:txEl>
-                                              <p:pRg st="5" end="5"/>
-                                            </p:txEl>
-                                          </p:spTgt>
-                                        </p:tgtEl>
-                                        <p:attrNameLst>
-                                          <p:attrName>style.visibility</p:attrName>
-                                        </p:attrNameLst>
-                                      </p:cBhvr>
-                                      <p:to>
-                                        <p:strVal val="visible"/>
-                                      </p:to>
-                                    </p:set>
-                                  </p:childTnLst>
-                                </p:cTn>
-                              </p:par>
-                              <p:par>
-                                <p:cTn id="21" presetID="1" presetClass="entr" presetSubtype="0" fill="hold" nodeType="withEffect">
-                                  <p:stCondLst>
-                                    <p:cond delay="0"/>
-                                  </p:stCondLst>
-                                  <p:childTnLst>
-                                    <p:set>
-                                      <p:cBhvr>
-                                        <p:cTn id="22" dur="1" fill="hold">
-                                          <p:stCondLst>
-                                            <p:cond delay="0"/>
-                                          </p:stCondLst>
-                                        </p:cTn>
-                                        <p:tgtEl>
-                                          <p:spTgt spid="6">
-                                            <p:txEl>
-                                              <p:pRg st="6" end="6"/>
                                             </p:txEl>
                                           </p:spTgt>
                                         </p:tgtEl>
@@ -14172,6 +14024,76 @@
             <a:endParaRPr lang="pl-PL" dirty="0">
               <a:latin typeface="Courier New" panose="02070309020205020404" pitchFamily="49" charset="0"/>
               <a:cs typeface="Courier New" panose="02070309020205020404" pitchFamily="49" charset="0"/>
+            </a:endParaRPr>
+          </a:p>
+        </p:txBody>
+      </p:sp>
+      <p:sp>
+        <p:nvSpPr>
+          <p:cNvPr id="8" name="pole tekstowe 7"/>
+          <p:cNvSpPr txBox="1"/>
+          <p:nvPr/>
+        </p:nvSpPr>
+        <p:spPr bwMode="auto">
+          <a:xfrm>
+            <a:off x="443707" y="4337616"/>
+            <a:ext cx="6751848" cy="518091"/>
+          </a:xfrm>
+          <a:prstGeom prst="rect">
+            <a:avLst/>
+          </a:prstGeom>
+          <a:noFill/>
+          <a:ln w="9525">
+            <a:noFill/>
+            <a:miter lim="800000"/>
+            <a:headEnd/>
+            <a:tailEnd/>
+          </a:ln>
+        </p:spPr>
+        <p:txBody>
+          <a:bodyPr wrap="none" lIns="0" tIns="0" rIns="0" bIns="0" rtlCol="0">
+            <a:spAutoFit/>
+          </a:bodyPr>
+          <a:lstStyle/>
+          <a:p>
+            <a:pPr>
+              <a:spcBef>
+                <a:spcPts val="100"/>
+              </a:spcBef>
+              <a:spcAft>
+                <a:spcPts val="100"/>
+              </a:spcAft>
+            </a:pPr>
+            <a:r>
+              <a:rPr lang="pl-PL" sz="1600" b="1" dirty="0" smtClean="0">
+                <a:solidFill>
+                  <a:srgbClr val="00B050"/>
+                </a:solidFill>
+              </a:rPr>
+              <a:t>Ostateczny termin zaliczenia ćwiczenia: czwartek 24 maja</a:t>
+            </a:r>
+          </a:p>
+          <a:p>
+            <a:pPr>
+              <a:spcBef>
+                <a:spcPts val="100"/>
+              </a:spcBef>
+              <a:spcAft>
+                <a:spcPts val="100"/>
+              </a:spcAft>
+            </a:pPr>
+            <a:r>
+              <a:rPr lang="pl-PL" sz="1600" b="1" dirty="0" smtClean="0">
+                <a:solidFill>
+                  <a:srgbClr val="00B050"/>
+                </a:solidFill>
+              </a:rPr>
+              <a:t>Rozwiązania dostarczone później nie będą uwzględniane (0 punktów)</a:t>
+            </a:r>
+            <a:endParaRPr lang="pl-PL" sz="1600" b="1" dirty="0">
+              <a:solidFill>
+                <a:srgbClr val="00B050"/>
+              </a:solidFill>
             </a:endParaRPr>
           </a:p>
         </p:txBody>

</xml_diff>

<commit_message>
Update prezentacji dla JdbcTemplate, aktualizacja terminow
</commit_message>
<xml_diff>
--- a/WDSR - ćwiczenie 5.pptx
+++ b/WDSR - ćwiczenie 5.pptx
@@ -5,10 +5,10 @@
     <p:sldMasterId id="2147483669" r:id="rId5"/>
   </p:sldMasterIdLst>
   <p:notesMasterIdLst>
-    <p:notesMasterId r:id="rId29"/>
+    <p:notesMasterId r:id="rId33"/>
   </p:notesMasterIdLst>
   <p:handoutMasterIdLst>
-    <p:handoutMasterId r:id="rId30"/>
+    <p:handoutMasterId r:id="rId34"/>
   </p:handoutMasterIdLst>
   <p:sldIdLst>
     <p:sldId id="286" r:id="rId6"/>
@@ -33,7 +33,11 @@
     <p:sldId id="477" r:id="rId25"/>
     <p:sldId id="478" r:id="rId26"/>
     <p:sldId id="479" r:id="rId27"/>
-    <p:sldId id="324" r:id="rId28"/>
+    <p:sldId id="483" r:id="rId28"/>
+    <p:sldId id="485" r:id="rId29"/>
+    <p:sldId id="486" r:id="rId30"/>
+    <p:sldId id="484" r:id="rId31"/>
+    <p:sldId id="324" r:id="rId32"/>
   </p:sldIdLst>
   <p:sldSz cx="9144000" cy="5143500" type="screen16x9"/>
   <p:notesSz cx="6858000" cy="9144000"/>
@@ -263,7 +267,7 @@
             <a:fld id="{C4843D26-F355-3844-A4EF-19D4FD875597}" type="datetimeFigureOut">
               <a:rPr lang="de-DE" smtClean="0"/>
               <a:pPr/>
-              <a:t>09.05.2017</a:t>
+              <a:t>16.05.2017</a:t>
             </a:fld>
             <a:endParaRPr lang="de-DE" dirty="0"/>
           </a:p>
@@ -431,7 +435,7 @@
             <a:fld id="{8E2CFE12-C1FB-D740-8B6C-AFB72D5D4002}" type="datetimeFigureOut">
               <a:rPr lang="de-DE" smtClean="0"/>
               <a:pPr/>
-              <a:t>09.05.2017</a:t>
+              <a:t>16.05.2017</a:t>
             </a:fld>
             <a:endParaRPr lang="de-DE" dirty="0"/>
           </a:p>
@@ -1910,6 +1914,354 @@
     <p:extLst>
       <p:ext uri="{BB962C8B-B14F-4D97-AF65-F5344CB8AC3E}">
         <p14:creationId xmlns:p14="http://schemas.microsoft.com/office/powerpoint/2010/main" xmlns="" val="1529376990"/>
+      </p:ext>
+    </p:extLst>
+  </p:cSld>
+  <p:clrMapOvr>
+    <a:masterClrMapping/>
+  </p:clrMapOvr>
+</p:notes>
+</file>
+
+<file path=ppt/notesSlides/notesSlide22.xml><?xml version="1.0" encoding="utf-8"?>
+<p:notes xmlns:a="http://schemas.openxmlformats.org/drawingml/2006/main" xmlns:r="http://schemas.openxmlformats.org/officeDocument/2006/relationships" xmlns:p="http://schemas.openxmlformats.org/presentationml/2006/main">
+  <p:cSld>
+    <p:spTree>
+      <p:nvGrpSpPr>
+        <p:cNvPr id="1" name=""/>
+        <p:cNvGrpSpPr/>
+        <p:nvPr/>
+      </p:nvGrpSpPr>
+      <p:grpSpPr>
+        <a:xfrm>
+          <a:off x="0" y="0"/>
+          <a:ext cx="0" cy="0"/>
+          <a:chOff x="0" y="0"/>
+          <a:chExt cx="0" cy="0"/>
+        </a:xfrm>
+      </p:grpSpPr>
+      <p:sp>
+        <p:nvSpPr>
+          <p:cNvPr id="2" name="Folienbildplatzhalter 1"/>
+          <p:cNvSpPr>
+            <a:spLocks noGrp="1" noRot="1" noChangeAspect="1"/>
+          </p:cNvSpPr>
+          <p:nvPr>
+            <p:ph type="sldImg"/>
+          </p:nvPr>
+        </p:nvSpPr>
+        <p:spPr/>
+      </p:sp>
+      <p:sp>
+        <p:nvSpPr>
+          <p:cNvPr id="3" name="Notizenplatzhalter 2"/>
+          <p:cNvSpPr>
+            <a:spLocks noGrp="1"/>
+          </p:cNvSpPr>
+          <p:nvPr>
+            <p:ph type="body" idx="1"/>
+          </p:nvPr>
+        </p:nvSpPr>
+        <p:spPr/>
+        <p:txBody>
+          <a:bodyPr>
+            <a:normAutofit/>
+          </a:bodyPr>
+          <a:lstStyle/>
+          <a:p>
+            <a:endParaRPr lang="de-DE" dirty="0"/>
+          </a:p>
+        </p:txBody>
+      </p:sp>
+      <p:sp>
+        <p:nvSpPr>
+          <p:cNvPr id="4" name="Foliennummernplatzhalter 3"/>
+          <p:cNvSpPr>
+            <a:spLocks noGrp="1"/>
+          </p:cNvSpPr>
+          <p:nvPr>
+            <p:ph type="sldNum" sz="quarter" idx="10"/>
+          </p:nvPr>
+        </p:nvSpPr>
+        <p:spPr/>
+        <p:txBody>
+          <a:bodyPr/>
+          <a:lstStyle/>
+          <a:p>
+            <a:fld id="{150BA478-331B-4C41-B0D5-A69E59A4437F}" type="slidenum">
+              <a:rPr lang="de-DE" smtClean="0"/>
+              <a:pPr/>
+              <a:t>23</a:t>
+            </a:fld>
+            <a:endParaRPr lang="de-DE" dirty="0"/>
+          </a:p>
+        </p:txBody>
+      </p:sp>
+    </p:spTree>
+    <p:extLst>
+      <p:ext uri="{BB962C8B-B14F-4D97-AF65-F5344CB8AC3E}">
+        <p14:creationId xmlns:p14="http://schemas.microsoft.com/office/powerpoint/2010/main" xmlns="" val="1883132698"/>
+      </p:ext>
+    </p:extLst>
+  </p:cSld>
+  <p:clrMapOvr>
+    <a:masterClrMapping/>
+  </p:clrMapOvr>
+</p:notes>
+</file>
+
+<file path=ppt/notesSlides/notesSlide23.xml><?xml version="1.0" encoding="utf-8"?>
+<p:notes xmlns:a="http://schemas.openxmlformats.org/drawingml/2006/main" xmlns:r="http://schemas.openxmlformats.org/officeDocument/2006/relationships" xmlns:p="http://schemas.openxmlformats.org/presentationml/2006/main">
+  <p:cSld>
+    <p:spTree>
+      <p:nvGrpSpPr>
+        <p:cNvPr id="1" name=""/>
+        <p:cNvGrpSpPr/>
+        <p:nvPr/>
+      </p:nvGrpSpPr>
+      <p:grpSpPr>
+        <a:xfrm>
+          <a:off x="0" y="0"/>
+          <a:ext cx="0" cy="0"/>
+          <a:chOff x="0" y="0"/>
+          <a:chExt cx="0" cy="0"/>
+        </a:xfrm>
+      </p:grpSpPr>
+      <p:sp>
+        <p:nvSpPr>
+          <p:cNvPr id="2" name="Folienbildplatzhalter 1"/>
+          <p:cNvSpPr>
+            <a:spLocks noGrp="1" noRot="1" noChangeAspect="1"/>
+          </p:cNvSpPr>
+          <p:nvPr>
+            <p:ph type="sldImg"/>
+          </p:nvPr>
+        </p:nvSpPr>
+        <p:spPr/>
+      </p:sp>
+      <p:sp>
+        <p:nvSpPr>
+          <p:cNvPr id="3" name="Notizenplatzhalter 2"/>
+          <p:cNvSpPr>
+            <a:spLocks noGrp="1"/>
+          </p:cNvSpPr>
+          <p:nvPr>
+            <p:ph type="body" idx="1"/>
+          </p:nvPr>
+        </p:nvSpPr>
+        <p:spPr/>
+        <p:txBody>
+          <a:bodyPr>
+            <a:normAutofit/>
+          </a:bodyPr>
+          <a:lstStyle/>
+          <a:p>
+            <a:endParaRPr lang="de-DE" dirty="0"/>
+          </a:p>
+        </p:txBody>
+      </p:sp>
+      <p:sp>
+        <p:nvSpPr>
+          <p:cNvPr id="4" name="Foliennummernplatzhalter 3"/>
+          <p:cNvSpPr>
+            <a:spLocks noGrp="1"/>
+          </p:cNvSpPr>
+          <p:nvPr>
+            <p:ph type="sldNum" sz="quarter" idx="10"/>
+          </p:nvPr>
+        </p:nvSpPr>
+        <p:spPr/>
+        <p:txBody>
+          <a:bodyPr/>
+          <a:lstStyle/>
+          <a:p>
+            <a:fld id="{150BA478-331B-4C41-B0D5-A69E59A4437F}" type="slidenum">
+              <a:rPr lang="de-DE" smtClean="0"/>
+              <a:pPr/>
+              <a:t>24</a:t>
+            </a:fld>
+            <a:endParaRPr lang="de-DE" dirty="0"/>
+          </a:p>
+        </p:txBody>
+      </p:sp>
+    </p:spTree>
+    <p:extLst>
+      <p:ext uri="{BB962C8B-B14F-4D97-AF65-F5344CB8AC3E}">
+        <p14:creationId xmlns:p14="http://schemas.microsoft.com/office/powerpoint/2010/main" xmlns="" val="1883132698"/>
+      </p:ext>
+    </p:extLst>
+  </p:cSld>
+  <p:clrMapOvr>
+    <a:masterClrMapping/>
+  </p:clrMapOvr>
+</p:notes>
+</file>
+
+<file path=ppt/notesSlides/notesSlide24.xml><?xml version="1.0" encoding="utf-8"?>
+<p:notes xmlns:a="http://schemas.openxmlformats.org/drawingml/2006/main" xmlns:r="http://schemas.openxmlformats.org/officeDocument/2006/relationships" xmlns:p="http://schemas.openxmlformats.org/presentationml/2006/main">
+  <p:cSld>
+    <p:spTree>
+      <p:nvGrpSpPr>
+        <p:cNvPr id="1" name=""/>
+        <p:cNvGrpSpPr/>
+        <p:nvPr/>
+      </p:nvGrpSpPr>
+      <p:grpSpPr>
+        <a:xfrm>
+          <a:off x="0" y="0"/>
+          <a:ext cx="0" cy="0"/>
+          <a:chOff x="0" y="0"/>
+          <a:chExt cx="0" cy="0"/>
+        </a:xfrm>
+      </p:grpSpPr>
+      <p:sp>
+        <p:nvSpPr>
+          <p:cNvPr id="2" name="Folienbildplatzhalter 1"/>
+          <p:cNvSpPr>
+            <a:spLocks noGrp="1" noRot="1" noChangeAspect="1"/>
+          </p:cNvSpPr>
+          <p:nvPr>
+            <p:ph type="sldImg"/>
+          </p:nvPr>
+        </p:nvSpPr>
+        <p:spPr/>
+      </p:sp>
+      <p:sp>
+        <p:nvSpPr>
+          <p:cNvPr id="3" name="Notizenplatzhalter 2"/>
+          <p:cNvSpPr>
+            <a:spLocks noGrp="1"/>
+          </p:cNvSpPr>
+          <p:nvPr>
+            <p:ph type="body" idx="1"/>
+          </p:nvPr>
+        </p:nvSpPr>
+        <p:spPr/>
+        <p:txBody>
+          <a:bodyPr>
+            <a:normAutofit/>
+          </a:bodyPr>
+          <a:lstStyle/>
+          <a:p>
+            <a:endParaRPr lang="de-DE" dirty="0"/>
+          </a:p>
+        </p:txBody>
+      </p:sp>
+      <p:sp>
+        <p:nvSpPr>
+          <p:cNvPr id="4" name="Foliennummernplatzhalter 3"/>
+          <p:cNvSpPr>
+            <a:spLocks noGrp="1"/>
+          </p:cNvSpPr>
+          <p:nvPr>
+            <p:ph type="sldNum" sz="quarter" idx="10"/>
+          </p:nvPr>
+        </p:nvSpPr>
+        <p:spPr/>
+        <p:txBody>
+          <a:bodyPr/>
+          <a:lstStyle/>
+          <a:p>
+            <a:fld id="{150BA478-331B-4C41-B0D5-A69E59A4437F}" type="slidenum">
+              <a:rPr lang="de-DE" smtClean="0"/>
+              <a:pPr/>
+              <a:t>25</a:t>
+            </a:fld>
+            <a:endParaRPr lang="de-DE" dirty="0"/>
+          </a:p>
+        </p:txBody>
+      </p:sp>
+    </p:spTree>
+    <p:extLst>
+      <p:ext uri="{BB962C8B-B14F-4D97-AF65-F5344CB8AC3E}">
+        <p14:creationId xmlns:p14="http://schemas.microsoft.com/office/powerpoint/2010/main" xmlns="" val="1883132698"/>
+      </p:ext>
+    </p:extLst>
+  </p:cSld>
+  <p:clrMapOvr>
+    <a:masterClrMapping/>
+  </p:clrMapOvr>
+</p:notes>
+</file>
+
+<file path=ppt/notesSlides/notesSlide25.xml><?xml version="1.0" encoding="utf-8"?>
+<p:notes xmlns:a="http://schemas.openxmlformats.org/drawingml/2006/main" xmlns:r="http://schemas.openxmlformats.org/officeDocument/2006/relationships" xmlns:p="http://schemas.openxmlformats.org/presentationml/2006/main">
+  <p:cSld>
+    <p:spTree>
+      <p:nvGrpSpPr>
+        <p:cNvPr id="1" name=""/>
+        <p:cNvGrpSpPr/>
+        <p:nvPr/>
+      </p:nvGrpSpPr>
+      <p:grpSpPr>
+        <a:xfrm>
+          <a:off x="0" y="0"/>
+          <a:ext cx="0" cy="0"/>
+          <a:chOff x="0" y="0"/>
+          <a:chExt cx="0" cy="0"/>
+        </a:xfrm>
+      </p:grpSpPr>
+      <p:sp>
+        <p:nvSpPr>
+          <p:cNvPr id="2" name="Folienbildplatzhalter 1"/>
+          <p:cNvSpPr>
+            <a:spLocks noGrp="1" noRot="1" noChangeAspect="1"/>
+          </p:cNvSpPr>
+          <p:nvPr>
+            <p:ph type="sldImg"/>
+          </p:nvPr>
+        </p:nvSpPr>
+        <p:spPr/>
+      </p:sp>
+      <p:sp>
+        <p:nvSpPr>
+          <p:cNvPr id="3" name="Notizenplatzhalter 2"/>
+          <p:cNvSpPr>
+            <a:spLocks noGrp="1"/>
+          </p:cNvSpPr>
+          <p:nvPr>
+            <p:ph type="body" idx="1"/>
+          </p:nvPr>
+        </p:nvSpPr>
+        <p:spPr/>
+        <p:txBody>
+          <a:bodyPr>
+            <a:normAutofit/>
+          </a:bodyPr>
+          <a:lstStyle/>
+          <a:p>
+            <a:endParaRPr lang="de-DE" dirty="0"/>
+          </a:p>
+        </p:txBody>
+      </p:sp>
+      <p:sp>
+        <p:nvSpPr>
+          <p:cNvPr id="4" name="Foliennummernplatzhalter 3"/>
+          <p:cNvSpPr>
+            <a:spLocks noGrp="1"/>
+          </p:cNvSpPr>
+          <p:nvPr>
+            <p:ph type="sldNum" sz="quarter" idx="10"/>
+          </p:nvPr>
+        </p:nvSpPr>
+        <p:spPr/>
+        <p:txBody>
+          <a:bodyPr/>
+          <a:lstStyle/>
+          <a:p>
+            <a:fld id="{150BA478-331B-4C41-B0D5-A69E59A4437F}" type="slidenum">
+              <a:rPr lang="de-DE" smtClean="0"/>
+              <a:pPr/>
+              <a:t>26</a:t>
+            </a:fld>
+            <a:endParaRPr lang="de-DE" dirty="0"/>
+          </a:p>
+        </p:txBody>
+      </p:sp>
+    </p:spTree>
+    <p:extLst>
+      <p:ext uri="{BB962C8B-B14F-4D97-AF65-F5344CB8AC3E}">
+        <p14:creationId xmlns:p14="http://schemas.microsoft.com/office/powerpoint/2010/main" xmlns="" val="1883132698"/>
       </p:ext>
     </p:extLst>
   </p:cSld>
@@ -9345,8 +9697,12 @@
           <a:p>
             <a:pPr lvl="2"/>
             <a:r>
-              <a:rPr lang="pl-PL" b="1" dirty="0"/>
-              <a:t>jdbc:hsqldb:hsql://</a:t>
+              <a:rPr lang="pl-PL" b="1" dirty="0" err="1" smtClean="0"/>
+              <a:t>jdbc:hsqldb:hsql</a:t>
+            </a:r>
+            <a:r>
+              <a:rPr lang="pl-PL" b="1" dirty="0" smtClean="0"/>
+              <a:t>://</a:t>
             </a:r>
             <a:r>
               <a:rPr lang="pl-PL" b="1" dirty="0" smtClean="0"/>
@@ -14070,7 +14426,7 @@
                   <a:srgbClr val="00B050"/>
                 </a:solidFill>
               </a:rPr>
-              <a:t>Ostateczny termin zaliczenia ćwiczenia: czwartek 24 maja</a:t>
+              <a:t>Ostateczny termin zaliczenia ćwiczenia: wtorek 30 maja</a:t>
             </a:r>
           </a:p>
           <a:p>
@@ -14127,6 +14483,2050 @@
 </file>
 
 <file path=ppt/slides/slide23.xml><?xml version="1.0" encoding="utf-8"?>
+<p:sld xmlns:a="http://schemas.openxmlformats.org/drawingml/2006/main" xmlns:r="http://schemas.openxmlformats.org/officeDocument/2006/relationships" xmlns:p="http://schemas.openxmlformats.org/presentationml/2006/main">
+  <p:cSld>
+    <p:spTree>
+      <p:nvGrpSpPr>
+        <p:cNvPr id="1" name=""/>
+        <p:cNvGrpSpPr/>
+        <p:nvPr/>
+      </p:nvGrpSpPr>
+      <p:grpSpPr>
+        <a:xfrm>
+          <a:off x="0" y="0"/>
+          <a:ext cx="0" cy="0"/>
+          <a:chOff x="0" y="0"/>
+          <a:chExt cx="0" cy="0"/>
+        </a:xfrm>
+      </p:grpSpPr>
+      <p:sp>
+        <p:nvSpPr>
+          <p:cNvPr id="7" name="Titel 6"/>
+          <p:cNvSpPr>
+            <a:spLocks noGrp="1"/>
+          </p:cNvSpPr>
+          <p:nvPr>
+            <p:ph type="title"/>
+          </p:nvPr>
+        </p:nvSpPr>
+        <p:spPr/>
+        <p:txBody>
+          <a:bodyPr/>
+          <a:lstStyle/>
+          <a:p>
+            <a:r>
+              <a:rPr lang="pl-PL" dirty="0" smtClean="0"/>
+              <a:t>Ćwiczenie </a:t>
+            </a:r>
+            <a:r>
+              <a:rPr lang="pl-PL" dirty="0"/>
+              <a:t>5</a:t>
+            </a:r>
+            <a:r>
+              <a:rPr lang="pl-PL" dirty="0" smtClean="0"/>
+              <a:t>: Korzystanie z </a:t>
+            </a:r>
+            <a:r>
+              <a:rPr lang="pl-PL" dirty="0" err="1" smtClean="0"/>
+              <a:t>JdbcTemplate</a:t>
+            </a:r>
+            <a:endParaRPr lang="de-DE" dirty="0"/>
+          </a:p>
+        </p:txBody>
+      </p:sp>
+      <p:sp>
+        <p:nvSpPr>
+          <p:cNvPr id="5" name="Inhaltsplatzhalter 4"/>
+          <p:cNvSpPr>
+            <a:spLocks noGrp="1"/>
+          </p:cNvSpPr>
+          <p:nvPr>
+            <p:ph type="body" sz="quarter" idx="13"/>
+          </p:nvPr>
+        </p:nvSpPr>
+        <p:spPr/>
+        <p:txBody>
+          <a:bodyPr/>
+          <a:lstStyle/>
+          <a:p>
+            <a:r>
+              <a:rPr lang="pl-PL" dirty="0" smtClean="0"/>
+              <a:t>ĆWICZENIE 5</a:t>
+            </a:r>
+            <a:endParaRPr lang="de-DE" dirty="0"/>
+          </a:p>
+        </p:txBody>
+      </p:sp>
+      <p:sp>
+        <p:nvSpPr>
+          <p:cNvPr id="3" name="Prostokąt zaokrąglony 2"/>
+          <p:cNvSpPr/>
+          <p:nvPr/>
+        </p:nvSpPr>
+        <p:spPr>
+          <a:xfrm>
+            <a:off x="1609595" y="1546963"/>
+            <a:ext cx="5730657" cy="1991639"/>
+          </a:xfrm>
+          <a:prstGeom prst="roundRect">
+            <a:avLst/>
+          </a:prstGeom>
+          <a:ln/>
+        </p:spPr>
+        <p:style>
+          <a:lnRef idx="2">
+            <a:schemeClr val="accent3">
+              <a:shade val="50000"/>
+            </a:schemeClr>
+          </a:lnRef>
+          <a:fillRef idx="1">
+            <a:schemeClr val="accent3"/>
+          </a:fillRef>
+          <a:effectRef idx="0">
+            <a:schemeClr val="accent3"/>
+          </a:effectRef>
+          <a:fontRef idx="minor">
+            <a:schemeClr val="lt1"/>
+          </a:fontRef>
+        </p:style>
+        <p:txBody>
+          <a:bodyPr lIns="108000" tIns="108000" rIns="108000" bIns="108000" rtlCol="0" anchor="ctr"/>
+          <a:lstStyle/>
+          <a:p>
+            <a:pPr algn="ctr"/>
+            <a:r>
+              <a:rPr lang="pl-PL" sz="1600" dirty="0" smtClean="0">
+                <a:solidFill>
+                  <a:schemeClr val="tx1"/>
+                </a:solidFill>
+              </a:rPr>
+              <a:t>Ćwiczenie 5</a:t>
+            </a:r>
+          </a:p>
+          <a:p>
+            <a:pPr algn="ctr"/>
+            <a:r>
+              <a:rPr lang="pl-PL" sz="1600" dirty="0" err="1" smtClean="0"/>
+              <a:t>JdbcTemplate</a:t>
+            </a:r>
+            <a:endParaRPr lang="pl-PL" sz="1600" dirty="0" smtClean="0">
+              <a:solidFill>
+                <a:schemeClr val="tx1"/>
+              </a:solidFill>
+            </a:endParaRPr>
+          </a:p>
+        </p:txBody>
+      </p:sp>
+    </p:spTree>
+    <p:extLst>
+      <p:ext uri="{BB962C8B-B14F-4D97-AF65-F5344CB8AC3E}">
+        <p14:creationId xmlns:p14="http://schemas.microsoft.com/office/powerpoint/2010/main" xmlns="" val="3379363085"/>
+      </p:ext>
+    </p:extLst>
+  </p:cSld>
+  <p:clrMapOvr>
+    <a:masterClrMapping/>
+  </p:clrMapOvr>
+  <mc:AlternateContent xmlns:mc="http://schemas.openxmlformats.org/markup-compatibility/2006">
+    <mc:Choice xmlns:p14="http://schemas.microsoft.com/office/powerpoint/2010/main" xmlns="" Requires="p14">
+      <p:transition p14:dur="10"/>
+    </mc:Choice>
+    <mc:Fallback>
+      <p:transition/>
+    </mc:Fallback>
+  </mc:AlternateContent>
+  <p:timing>
+    <p:tnLst>
+      <p:par>
+        <p:cTn id="1" dur="indefinite" restart="never" nodeType="tmRoot"/>
+      </p:par>
+    </p:tnLst>
+  </p:timing>
+</p:sld>
+</file>
+
+<file path=ppt/slides/slide24.xml><?xml version="1.0" encoding="utf-8"?>
+<p:sld xmlns:a="http://schemas.openxmlformats.org/drawingml/2006/main" xmlns:r="http://schemas.openxmlformats.org/officeDocument/2006/relationships" xmlns:p="http://schemas.openxmlformats.org/presentationml/2006/main">
+  <p:cSld>
+    <p:spTree>
+      <p:nvGrpSpPr>
+        <p:cNvPr id="1" name=""/>
+        <p:cNvGrpSpPr/>
+        <p:nvPr/>
+      </p:nvGrpSpPr>
+      <p:grpSpPr>
+        <a:xfrm>
+          <a:off x="0" y="0"/>
+          <a:ext cx="0" cy="0"/>
+          <a:chOff x="0" y="0"/>
+          <a:chExt cx="0" cy="0"/>
+        </a:xfrm>
+      </p:grpSpPr>
+      <p:sp>
+        <p:nvSpPr>
+          <p:cNvPr id="7" name="Titel 6"/>
+          <p:cNvSpPr>
+            <a:spLocks noGrp="1"/>
+          </p:cNvSpPr>
+          <p:nvPr>
+            <p:ph type="title"/>
+          </p:nvPr>
+        </p:nvSpPr>
+        <p:spPr/>
+        <p:txBody>
+          <a:bodyPr/>
+          <a:lstStyle/>
+          <a:p>
+            <a:r>
+              <a:rPr lang="pl-PL" dirty="0" err="1" smtClean="0"/>
+              <a:t>JdbcTemplate</a:t>
+            </a:r>
+            <a:endParaRPr lang="de-DE" dirty="0"/>
+          </a:p>
+        </p:txBody>
+      </p:sp>
+      <p:sp>
+        <p:nvSpPr>
+          <p:cNvPr id="5" name="Inhaltsplatzhalter 4"/>
+          <p:cNvSpPr>
+            <a:spLocks noGrp="1"/>
+          </p:cNvSpPr>
+          <p:nvPr>
+            <p:ph type="body" sz="quarter" idx="13"/>
+          </p:nvPr>
+        </p:nvSpPr>
+        <p:spPr/>
+        <p:txBody>
+          <a:bodyPr/>
+          <a:lstStyle/>
+          <a:p>
+            <a:r>
+              <a:rPr lang="pl-PL" dirty="0" smtClean="0"/>
+              <a:t>ĆWICZENIE 5</a:t>
+            </a:r>
+            <a:endParaRPr lang="de-DE" dirty="0"/>
+          </a:p>
+        </p:txBody>
+      </p:sp>
+      <p:sp>
+        <p:nvSpPr>
+          <p:cNvPr id="6" name="Symbol zastępczy zawartości 1"/>
+          <p:cNvSpPr>
+            <a:spLocks noGrp="1"/>
+          </p:cNvSpPr>
+          <p:nvPr>
+            <p:ph idx="1"/>
+          </p:nvPr>
+        </p:nvSpPr>
+        <p:spPr>
+          <a:xfrm>
+            <a:off x="443707" y="1119187"/>
+            <a:ext cx="8023887" cy="3362325"/>
+          </a:xfrm>
+        </p:spPr>
+        <p:txBody>
+          <a:bodyPr>
+            <a:normAutofit/>
+          </a:bodyPr>
+          <a:lstStyle/>
+          <a:p>
+            <a:r>
+              <a:rPr lang="pl-PL" dirty="0" smtClean="0"/>
+              <a:t>Co robi </a:t>
+            </a:r>
+            <a:r>
+              <a:rPr lang="pl-PL" dirty="0" err="1" smtClean="0"/>
+              <a:t>JdbcTemplate</a:t>
+            </a:r>
+            <a:r>
+              <a:rPr lang="pl-PL" dirty="0" smtClean="0"/>
+              <a:t>:</a:t>
+            </a:r>
+          </a:p>
+          <a:p>
+            <a:pPr lvl="1"/>
+            <a:r>
+              <a:rPr lang="pl-PL" dirty="0" smtClean="0"/>
+              <a:t>Tworzy </a:t>
+            </a:r>
+            <a:r>
+              <a:rPr lang="pl-PL" dirty="0" err="1" smtClean="0"/>
+              <a:t>Statement</a:t>
+            </a:r>
+            <a:endParaRPr lang="pl-PL" dirty="0" smtClean="0"/>
+          </a:p>
+          <a:p>
+            <a:pPr lvl="1"/>
+            <a:r>
+              <a:rPr lang="pl-PL" dirty="0" smtClean="0"/>
+              <a:t>Iteruje się po wyniku</a:t>
+            </a:r>
+          </a:p>
+          <a:p>
+            <a:pPr lvl="1"/>
+            <a:r>
+              <a:rPr lang="pl-PL" dirty="0" smtClean="0"/>
+              <a:t>Procesuje wyjątki</a:t>
+            </a:r>
+          </a:p>
+          <a:p>
+            <a:pPr lvl="1"/>
+            <a:r>
+              <a:rPr lang="pl-PL" dirty="0" smtClean="0"/>
+              <a:t>Obsługuje </a:t>
+            </a:r>
+            <a:r>
+              <a:rPr lang="pl-PL" dirty="0" err="1" smtClean="0"/>
+              <a:t>tranzakcje</a:t>
+            </a:r>
+            <a:endParaRPr lang="pl-PL" dirty="0" smtClean="0"/>
+          </a:p>
+          <a:p>
+            <a:pPr lvl="1"/>
+            <a:r>
+              <a:rPr lang="pl-PL" dirty="0" smtClean="0"/>
+              <a:t>Zamyka </a:t>
+            </a:r>
+            <a:r>
+              <a:rPr lang="pl-PL" dirty="0" err="1" smtClean="0"/>
+              <a:t>Statement</a:t>
+            </a:r>
+            <a:r>
+              <a:rPr lang="pl-PL" dirty="0" smtClean="0"/>
+              <a:t> i </a:t>
+            </a:r>
+            <a:r>
+              <a:rPr lang="pl-PL" dirty="0" err="1" smtClean="0"/>
+              <a:t>ResultSet</a:t>
+            </a:r>
+            <a:endParaRPr lang="pl-PL" dirty="0" smtClean="0"/>
+          </a:p>
+          <a:p>
+            <a:pPr lvl="1"/>
+            <a:endParaRPr lang="pl-PL" dirty="0" smtClean="0"/>
+          </a:p>
+          <a:p>
+            <a:r>
+              <a:rPr lang="pl-PL" dirty="0" smtClean="0"/>
+              <a:t>Czego nie robi </a:t>
+            </a:r>
+            <a:r>
+              <a:rPr lang="pl-PL" dirty="0" err="1" smtClean="0"/>
+              <a:t>JdbcTemplate</a:t>
+            </a:r>
+            <a:r>
+              <a:rPr lang="pl-PL" dirty="0" smtClean="0"/>
+              <a:t> – co trzeba mu dostarczyć:</a:t>
+            </a:r>
+          </a:p>
+          <a:p>
+            <a:pPr lvl="1"/>
+            <a:r>
+              <a:rPr lang="pl-PL" dirty="0" smtClean="0"/>
+              <a:t>Nie definiuje parametrów połączenia – należy mu przekazać obiekt implementujący interfejs: </a:t>
+            </a:r>
+            <a:r>
+              <a:rPr lang="pl-PL" dirty="0" err="1" smtClean="0"/>
+              <a:t>javax.sql.DateSource</a:t>
+            </a:r>
+            <a:endParaRPr lang="pl-PL" dirty="0" smtClean="0"/>
+          </a:p>
+          <a:p>
+            <a:pPr lvl="1"/>
+            <a:r>
+              <a:rPr lang="pl-PL" dirty="0" smtClean="0"/>
+              <a:t>Nie tworzy wyrażenia </a:t>
+            </a:r>
+            <a:r>
+              <a:rPr lang="pl-PL" dirty="0" err="1" smtClean="0"/>
+              <a:t>Sql</a:t>
+            </a:r>
+            <a:r>
+              <a:rPr lang="pl-PL" dirty="0" smtClean="0"/>
+              <a:t> – trzeba mu je podać.</a:t>
+            </a:r>
+          </a:p>
+          <a:p>
+            <a:pPr lvl="1"/>
+            <a:r>
+              <a:rPr lang="pl-PL" dirty="0" smtClean="0"/>
+              <a:t>Nie deklaruje parametrów i ich wartości – trzeba mu je podać.</a:t>
+            </a:r>
+          </a:p>
+          <a:p>
+            <a:pPr lvl="1"/>
+            <a:r>
+              <a:rPr lang="pl-PL" dirty="0" smtClean="0"/>
+              <a:t>Nie procesuje wyniku – samo procesowanie zależy od potrzeb aplikacji.</a:t>
+            </a:r>
+          </a:p>
+          <a:p>
+            <a:pPr lvl="1">
+              <a:buNone/>
+            </a:pPr>
+            <a:endParaRPr lang="pl-PL" dirty="0" smtClean="0"/>
+          </a:p>
+          <a:p>
+            <a:pPr lvl="1"/>
+            <a:endParaRPr lang="pl-PL" dirty="0" smtClean="0"/>
+          </a:p>
+          <a:p>
+            <a:pPr lvl="1"/>
+            <a:endParaRPr lang="pl-PL" dirty="0"/>
+          </a:p>
+        </p:txBody>
+      </p:sp>
+    </p:spTree>
+    <p:extLst>
+      <p:ext uri="{BB962C8B-B14F-4D97-AF65-F5344CB8AC3E}">
+        <p14:creationId xmlns:p14="http://schemas.microsoft.com/office/powerpoint/2010/main" xmlns="" val="3199221210"/>
+      </p:ext>
+    </p:extLst>
+  </p:cSld>
+  <p:clrMapOvr>
+    <a:masterClrMapping/>
+  </p:clrMapOvr>
+  <mc:AlternateContent xmlns:mc="http://schemas.openxmlformats.org/markup-compatibility/2006">
+    <mc:Choice xmlns:p14="http://schemas.microsoft.com/office/powerpoint/2010/main" xmlns="" Requires="p14">
+      <p:transition p14:dur="10"/>
+    </mc:Choice>
+    <mc:Fallback>
+      <p:transition/>
+    </mc:Fallback>
+  </mc:AlternateContent>
+  <p:timing>
+    <p:tnLst>
+      <p:par>
+        <p:cTn id="1" dur="indefinite" restart="never" nodeType="tmRoot">
+          <p:childTnLst>
+            <p:seq concurrent="1" nextAc="seek">
+              <p:cTn id="2" dur="indefinite" nodeType="mainSeq">
+                <p:childTnLst>
+                  <p:par>
+                    <p:cTn id="3" fill="hold">
+                      <p:stCondLst>
+                        <p:cond delay="indefinite"/>
+                        <p:cond evt="onBegin" delay="0">
+                          <p:tn val="2"/>
+                        </p:cond>
+                      </p:stCondLst>
+                      <p:childTnLst>
+                        <p:par>
+                          <p:cTn id="4" fill="hold">
+                            <p:stCondLst>
+                              <p:cond delay="0"/>
+                            </p:stCondLst>
+                            <p:childTnLst>
+                              <p:par>
+                                <p:cTn id="5" presetID="1" presetClass="entr" presetSubtype="0" fill="hold" nodeType="withEffect">
+                                  <p:stCondLst>
+                                    <p:cond delay="0"/>
+                                  </p:stCondLst>
+                                  <p:childTnLst>
+                                    <p:set>
+                                      <p:cBhvr>
+                                        <p:cTn id="6" dur="1" fill="hold">
+                                          <p:stCondLst>
+                                            <p:cond delay="0"/>
+                                          </p:stCondLst>
+                                        </p:cTn>
+                                        <p:tgtEl>
+                                          <p:spTgt spid="6">
+                                            <p:txEl>
+                                              <p:pRg st="0" end="0"/>
+                                            </p:txEl>
+                                          </p:spTgt>
+                                        </p:tgtEl>
+                                        <p:attrNameLst>
+                                          <p:attrName>style.visibility</p:attrName>
+                                        </p:attrNameLst>
+                                      </p:cBhvr>
+                                      <p:to>
+                                        <p:strVal val="visible"/>
+                                      </p:to>
+                                    </p:set>
+                                  </p:childTnLst>
+                                </p:cTn>
+                              </p:par>
+                              <p:par>
+                                <p:cTn id="7" presetID="1" presetClass="entr" presetSubtype="0" fill="hold" nodeType="withEffect">
+                                  <p:stCondLst>
+                                    <p:cond delay="0"/>
+                                  </p:stCondLst>
+                                  <p:childTnLst>
+                                    <p:set>
+                                      <p:cBhvr>
+                                        <p:cTn id="8" dur="1" fill="hold">
+                                          <p:stCondLst>
+                                            <p:cond delay="0"/>
+                                          </p:stCondLst>
+                                        </p:cTn>
+                                        <p:tgtEl>
+                                          <p:spTgt spid="6">
+                                            <p:txEl>
+                                              <p:pRg st="1" end="1"/>
+                                            </p:txEl>
+                                          </p:spTgt>
+                                        </p:tgtEl>
+                                        <p:attrNameLst>
+                                          <p:attrName>style.visibility</p:attrName>
+                                        </p:attrNameLst>
+                                      </p:cBhvr>
+                                      <p:to>
+                                        <p:strVal val="visible"/>
+                                      </p:to>
+                                    </p:set>
+                                  </p:childTnLst>
+                                </p:cTn>
+                              </p:par>
+                              <p:par>
+                                <p:cTn id="9" presetID="1" presetClass="entr" presetSubtype="0" fill="hold" nodeType="withEffect">
+                                  <p:stCondLst>
+                                    <p:cond delay="0"/>
+                                  </p:stCondLst>
+                                  <p:childTnLst>
+                                    <p:set>
+                                      <p:cBhvr>
+                                        <p:cTn id="10" dur="1" fill="hold">
+                                          <p:stCondLst>
+                                            <p:cond delay="0"/>
+                                          </p:stCondLst>
+                                        </p:cTn>
+                                        <p:tgtEl>
+                                          <p:spTgt spid="6">
+                                            <p:txEl>
+                                              <p:pRg st="2" end="2"/>
+                                            </p:txEl>
+                                          </p:spTgt>
+                                        </p:tgtEl>
+                                        <p:attrNameLst>
+                                          <p:attrName>style.visibility</p:attrName>
+                                        </p:attrNameLst>
+                                      </p:cBhvr>
+                                      <p:to>
+                                        <p:strVal val="visible"/>
+                                      </p:to>
+                                    </p:set>
+                                  </p:childTnLst>
+                                </p:cTn>
+                              </p:par>
+                              <p:par>
+                                <p:cTn id="11" presetID="1" presetClass="entr" presetSubtype="0" fill="hold" nodeType="withEffect">
+                                  <p:stCondLst>
+                                    <p:cond delay="0"/>
+                                  </p:stCondLst>
+                                  <p:childTnLst>
+                                    <p:set>
+                                      <p:cBhvr>
+                                        <p:cTn id="12" dur="1" fill="hold">
+                                          <p:stCondLst>
+                                            <p:cond delay="0"/>
+                                          </p:stCondLst>
+                                        </p:cTn>
+                                        <p:tgtEl>
+                                          <p:spTgt spid="6">
+                                            <p:txEl>
+                                              <p:pRg st="3" end="3"/>
+                                            </p:txEl>
+                                          </p:spTgt>
+                                        </p:tgtEl>
+                                        <p:attrNameLst>
+                                          <p:attrName>style.visibility</p:attrName>
+                                        </p:attrNameLst>
+                                      </p:cBhvr>
+                                      <p:to>
+                                        <p:strVal val="visible"/>
+                                      </p:to>
+                                    </p:set>
+                                  </p:childTnLst>
+                                </p:cTn>
+                              </p:par>
+                              <p:par>
+                                <p:cTn id="13" presetID="1" presetClass="entr" presetSubtype="0" fill="hold" nodeType="withEffect">
+                                  <p:stCondLst>
+                                    <p:cond delay="0"/>
+                                  </p:stCondLst>
+                                  <p:childTnLst>
+                                    <p:set>
+                                      <p:cBhvr>
+                                        <p:cTn id="14" dur="1" fill="hold">
+                                          <p:stCondLst>
+                                            <p:cond delay="0"/>
+                                          </p:stCondLst>
+                                        </p:cTn>
+                                        <p:tgtEl>
+                                          <p:spTgt spid="6">
+                                            <p:txEl>
+                                              <p:pRg st="4" end="4"/>
+                                            </p:txEl>
+                                          </p:spTgt>
+                                        </p:tgtEl>
+                                        <p:attrNameLst>
+                                          <p:attrName>style.visibility</p:attrName>
+                                        </p:attrNameLst>
+                                      </p:cBhvr>
+                                      <p:to>
+                                        <p:strVal val="visible"/>
+                                      </p:to>
+                                    </p:set>
+                                  </p:childTnLst>
+                                </p:cTn>
+                              </p:par>
+                              <p:par>
+                                <p:cTn id="15" presetID="1" presetClass="entr" presetSubtype="0" fill="hold" nodeType="withEffect">
+                                  <p:stCondLst>
+                                    <p:cond delay="0"/>
+                                  </p:stCondLst>
+                                  <p:childTnLst>
+                                    <p:set>
+                                      <p:cBhvr>
+                                        <p:cTn id="16" dur="1" fill="hold">
+                                          <p:stCondLst>
+                                            <p:cond delay="0"/>
+                                          </p:stCondLst>
+                                        </p:cTn>
+                                        <p:tgtEl>
+                                          <p:spTgt spid="6">
+                                            <p:txEl>
+                                              <p:pRg st="5" end="5"/>
+                                            </p:txEl>
+                                          </p:spTgt>
+                                        </p:tgtEl>
+                                        <p:attrNameLst>
+                                          <p:attrName>style.visibility</p:attrName>
+                                        </p:attrNameLst>
+                                      </p:cBhvr>
+                                      <p:to>
+                                        <p:strVal val="visible"/>
+                                      </p:to>
+                                    </p:set>
+                                  </p:childTnLst>
+                                </p:cTn>
+                              </p:par>
+                              <p:par>
+                                <p:cTn id="17" presetID="1" presetClass="entr" presetSubtype="0" fill="hold" nodeType="withEffect">
+                                  <p:stCondLst>
+                                    <p:cond delay="0"/>
+                                  </p:stCondLst>
+                                  <p:childTnLst>
+                                    <p:set>
+                                      <p:cBhvr>
+                                        <p:cTn id="18" dur="1" fill="hold">
+                                          <p:stCondLst>
+                                            <p:cond delay="0"/>
+                                          </p:stCondLst>
+                                        </p:cTn>
+                                        <p:tgtEl>
+                                          <p:spTgt spid="6">
+                                            <p:txEl>
+                                              <p:pRg st="7" end="7"/>
+                                            </p:txEl>
+                                          </p:spTgt>
+                                        </p:tgtEl>
+                                        <p:attrNameLst>
+                                          <p:attrName>style.visibility</p:attrName>
+                                        </p:attrNameLst>
+                                      </p:cBhvr>
+                                      <p:to>
+                                        <p:strVal val="visible"/>
+                                      </p:to>
+                                    </p:set>
+                                  </p:childTnLst>
+                                </p:cTn>
+                              </p:par>
+                              <p:par>
+                                <p:cTn id="19" presetID="1" presetClass="entr" presetSubtype="0" fill="hold" nodeType="withEffect">
+                                  <p:stCondLst>
+                                    <p:cond delay="0"/>
+                                  </p:stCondLst>
+                                  <p:childTnLst>
+                                    <p:set>
+                                      <p:cBhvr>
+                                        <p:cTn id="20" dur="1" fill="hold">
+                                          <p:stCondLst>
+                                            <p:cond delay="0"/>
+                                          </p:stCondLst>
+                                        </p:cTn>
+                                        <p:tgtEl>
+                                          <p:spTgt spid="6">
+                                            <p:txEl>
+                                              <p:pRg st="8" end="8"/>
+                                            </p:txEl>
+                                          </p:spTgt>
+                                        </p:tgtEl>
+                                        <p:attrNameLst>
+                                          <p:attrName>style.visibility</p:attrName>
+                                        </p:attrNameLst>
+                                      </p:cBhvr>
+                                      <p:to>
+                                        <p:strVal val="visible"/>
+                                      </p:to>
+                                    </p:set>
+                                  </p:childTnLst>
+                                </p:cTn>
+                              </p:par>
+                              <p:par>
+                                <p:cTn id="21" presetID="1" presetClass="entr" presetSubtype="0" fill="hold" nodeType="withEffect">
+                                  <p:stCondLst>
+                                    <p:cond delay="0"/>
+                                  </p:stCondLst>
+                                  <p:childTnLst>
+                                    <p:set>
+                                      <p:cBhvr>
+                                        <p:cTn id="22" dur="1" fill="hold">
+                                          <p:stCondLst>
+                                            <p:cond delay="0"/>
+                                          </p:stCondLst>
+                                        </p:cTn>
+                                        <p:tgtEl>
+                                          <p:spTgt spid="6">
+                                            <p:txEl>
+                                              <p:pRg st="9" end="9"/>
+                                            </p:txEl>
+                                          </p:spTgt>
+                                        </p:tgtEl>
+                                        <p:attrNameLst>
+                                          <p:attrName>style.visibility</p:attrName>
+                                        </p:attrNameLst>
+                                      </p:cBhvr>
+                                      <p:to>
+                                        <p:strVal val="visible"/>
+                                      </p:to>
+                                    </p:set>
+                                  </p:childTnLst>
+                                </p:cTn>
+                              </p:par>
+                              <p:par>
+                                <p:cTn id="23" presetID="1" presetClass="entr" presetSubtype="0" fill="hold" nodeType="withEffect">
+                                  <p:stCondLst>
+                                    <p:cond delay="0"/>
+                                  </p:stCondLst>
+                                  <p:childTnLst>
+                                    <p:set>
+                                      <p:cBhvr>
+                                        <p:cTn id="24" dur="1" fill="hold">
+                                          <p:stCondLst>
+                                            <p:cond delay="0"/>
+                                          </p:stCondLst>
+                                        </p:cTn>
+                                        <p:tgtEl>
+                                          <p:spTgt spid="6">
+                                            <p:txEl>
+                                              <p:pRg st="10" end="10"/>
+                                            </p:txEl>
+                                          </p:spTgt>
+                                        </p:tgtEl>
+                                        <p:attrNameLst>
+                                          <p:attrName>style.visibility</p:attrName>
+                                        </p:attrNameLst>
+                                      </p:cBhvr>
+                                      <p:to>
+                                        <p:strVal val="visible"/>
+                                      </p:to>
+                                    </p:set>
+                                  </p:childTnLst>
+                                </p:cTn>
+                              </p:par>
+                              <p:par>
+                                <p:cTn id="25" presetID="1" presetClass="entr" presetSubtype="0" fill="hold" nodeType="withEffect">
+                                  <p:stCondLst>
+                                    <p:cond delay="0"/>
+                                  </p:stCondLst>
+                                  <p:childTnLst>
+                                    <p:set>
+                                      <p:cBhvr>
+                                        <p:cTn id="26" dur="1" fill="hold">
+                                          <p:stCondLst>
+                                            <p:cond delay="0"/>
+                                          </p:stCondLst>
+                                        </p:cTn>
+                                        <p:tgtEl>
+                                          <p:spTgt spid="6">
+                                            <p:txEl>
+                                              <p:pRg st="11" end="11"/>
+                                            </p:txEl>
+                                          </p:spTgt>
+                                        </p:tgtEl>
+                                        <p:attrNameLst>
+                                          <p:attrName>style.visibility</p:attrName>
+                                        </p:attrNameLst>
+                                      </p:cBhvr>
+                                      <p:to>
+                                        <p:strVal val="visible"/>
+                                      </p:to>
+                                    </p:set>
+                                  </p:childTnLst>
+                                </p:cTn>
+                              </p:par>
+                            </p:childTnLst>
+                          </p:cTn>
+                        </p:par>
+                      </p:childTnLst>
+                    </p:cTn>
+                  </p:par>
+                </p:childTnLst>
+              </p:cTn>
+              <p:prevCondLst>
+                <p:cond evt="onPrev" delay="0">
+                  <p:tgtEl>
+                    <p:sldTgt/>
+                  </p:tgtEl>
+                </p:cond>
+              </p:prevCondLst>
+              <p:nextCondLst>
+                <p:cond evt="onNext" delay="0">
+                  <p:tgtEl>
+                    <p:sldTgt/>
+                  </p:tgtEl>
+                </p:cond>
+              </p:nextCondLst>
+            </p:seq>
+          </p:childTnLst>
+        </p:cTn>
+      </p:par>
+    </p:tnLst>
+  </p:timing>
+</p:sld>
+</file>
+
+<file path=ppt/slides/slide25.xml><?xml version="1.0" encoding="utf-8"?>
+<p:sld xmlns:a="http://schemas.openxmlformats.org/drawingml/2006/main" xmlns:r="http://schemas.openxmlformats.org/officeDocument/2006/relationships" xmlns:p="http://schemas.openxmlformats.org/presentationml/2006/main">
+  <p:cSld>
+    <p:spTree>
+      <p:nvGrpSpPr>
+        <p:cNvPr id="1" name=""/>
+        <p:cNvGrpSpPr/>
+        <p:nvPr/>
+      </p:nvGrpSpPr>
+      <p:grpSpPr>
+        <a:xfrm>
+          <a:off x="0" y="0"/>
+          <a:ext cx="0" cy="0"/>
+          <a:chOff x="0" y="0"/>
+          <a:chExt cx="0" cy="0"/>
+        </a:xfrm>
+      </p:grpSpPr>
+      <p:sp>
+        <p:nvSpPr>
+          <p:cNvPr id="7" name="Titel 6"/>
+          <p:cNvSpPr>
+            <a:spLocks noGrp="1"/>
+          </p:cNvSpPr>
+          <p:nvPr>
+            <p:ph type="title"/>
+          </p:nvPr>
+        </p:nvSpPr>
+        <p:spPr/>
+        <p:txBody>
+          <a:bodyPr/>
+          <a:lstStyle/>
+          <a:p>
+            <a:r>
+              <a:rPr lang="pl-PL" dirty="0" err="1" smtClean="0"/>
+              <a:t>JdbcTemplate</a:t>
+            </a:r>
+            <a:r>
+              <a:rPr lang="pl-PL" dirty="0" smtClean="0"/>
+              <a:t> – przykładowe użycie</a:t>
+            </a:r>
+            <a:endParaRPr lang="de-DE" dirty="0"/>
+          </a:p>
+        </p:txBody>
+      </p:sp>
+      <p:sp>
+        <p:nvSpPr>
+          <p:cNvPr id="5" name="Inhaltsplatzhalter 4"/>
+          <p:cNvSpPr>
+            <a:spLocks noGrp="1"/>
+          </p:cNvSpPr>
+          <p:nvPr>
+            <p:ph type="body" sz="quarter" idx="13"/>
+          </p:nvPr>
+        </p:nvSpPr>
+        <p:spPr/>
+        <p:txBody>
+          <a:bodyPr/>
+          <a:lstStyle/>
+          <a:p>
+            <a:r>
+              <a:rPr lang="pl-PL" dirty="0" smtClean="0"/>
+              <a:t>ĆWICZENIE 5</a:t>
+            </a:r>
+            <a:endParaRPr lang="de-DE" dirty="0"/>
+          </a:p>
+        </p:txBody>
+      </p:sp>
+      <p:sp>
+        <p:nvSpPr>
+          <p:cNvPr id="9" name="Symbol zastępczy zawartości 1"/>
+          <p:cNvSpPr>
+            <a:spLocks noGrp="1"/>
+          </p:cNvSpPr>
+          <p:nvPr>
+            <p:ph idx="1"/>
+          </p:nvPr>
+        </p:nvSpPr>
+        <p:spPr/>
+        <p:txBody>
+          <a:bodyPr>
+            <a:normAutofit/>
+          </a:bodyPr>
+          <a:lstStyle/>
+          <a:p>
+            <a:pPr marL="0" indent="0">
+              <a:buNone/>
+            </a:pPr>
+            <a:r>
+              <a:rPr lang="pl-PL" dirty="0" smtClean="0">
+                <a:latin typeface="Courier New" panose="02070309020205020404" pitchFamily="49" charset="0"/>
+                <a:cs typeface="Courier New" panose="02070309020205020404" pitchFamily="49" charset="0"/>
+              </a:rPr>
+              <a:t>// ...</a:t>
+            </a:r>
+            <a:endParaRPr lang="pl-PL" dirty="0">
+              <a:latin typeface="Courier New" panose="02070309020205020404" pitchFamily="49" charset="0"/>
+              <a:cs typeface="Courier New" panose="02070309020205020404" pitchFamily="49" charset="0"/>
+            </a:endParaRPr>
+          </a:p>
+          <a:p>
+            <a:pPr marL="0" indent="0">
+              <a:buNone/>
+            </a:pPr>
+            <a:r>
+              <a:rPr lang="pl-PL" dirty="0" smtClean="0">
+                <a:latin typeface="Courier New" panose="02070309020205020404" pitchFamily="49" charset="0"/>
+                <a:cs typeface="Courier New" panose="02070309020205020404" pitchFamily="49" charset="0"/>
+              </a:rPr>
+              <a:t>	</a:t>
+            </a:r>
+            <a:r>
+              <a:rPr lang="pl-PL" dirty="0" err="1" smtClean="0">
+                <a:latin typeface="Courier New" panose="02070309020205020404" pitchFamily="49" charset="0"/>
+                <a:cs typeface="Courier New" panose="02070309020205020404" pitchFamily="49" charset="0"/>
+              </a:rPr>
+              <a:t>DateSource</a:t>
+            </a:r>
+            <a:r>
+              <a:rPr lang="pl-PL" dirty="0" smtClean="0">
+                <a:latin typeface="Courier New" panose="02070309020205020404" pitchFamily="49" charset="0"/>
+                <a:cs typeface="Courier New" panose="02070309020205020404" pitchFamily="49" charset="0"/>
+              </a:rPr>
+              <a:t> </a:t>
+            </a:r>
+            <a:r>
+              <a:rPr lang="pl-PL" dirty="0" err="1" smtClean="0">
+                <a:latin typeface="Courier New" panose="02070309020205020404" pitchFamily="49" charset="0"/>
+                <a:cs typeface="Courier New" panose="02070309020205020404" pitchFamily="49" charset="0"/>
+              </a:rPr>
+              <a:t>dataSource</a:t>
+            </a:r>
+            <a:r>
+              <a:rPr lang="pl-PL" dirty="0" smtClean="0">
+                <a:latin typeface="Courier New" panose="02070309020205020404" pitchFamily="49" charset="0"/>
+                <a:cs typeface="Courier New" panose="02070309020205020404" pitchFamily="49" charset="0"/>
+              </a:rPr>
+              <a:t> = </a:t>
+            </a:r>
+            <a:r>
+              <a:rPr lang="pl-PL" dirty="0" err="1" smtClean="0">
+                <a:latin typeface="Courier New" panose="02070309020205020404" pitchFamily="49" charset="0"/>
+                <a:cs typeface="Courier New" panose="02070309020205020404" pitchFamily="49" charset="0"/>
+              </a:rPr>
+              <a:t>new</a:t>
+            </a:r>
+            <a:r>
+              <a:rPr lang="pl-PL" dirty="0" smtClean="0">
+                <a:latin typeface="Courier New" panose="02070309020205020404" pitchFamily="49" charset="0"/>
+                <a:cs typeface="Courier New" panose="02070309020205020404" pitchFamily="49" charset="0"/>
+              </a:rPr>
+              <a:t> </a:t>
+            </a:r>
+            <a:r>
+              <a:rPr lang="pl-PL" dirty="0" err="1" smtClean="0">
+                <a:latin typeface="Courier New" panose="02070309020205020404" pitchFamily="49" charset="0"/>
+                <a:cs typeface="Courier New" panose="02070309020205020404" pitchFamily="49" charset="0"/>
+              </a:rPr>
+              <a:t>BasicDateSource</a:t>
+            </a:r>
+            <a:r>
+              <a:rPr lang="pl-PL" dirty="0" smtClean="0">
+                <a:latin typeface="Courier New" panose="02070309020205020404" pitchFamily="49" charset="0"/>
+                <a:cs typeface="Courier New" panose="02070309020205020404" pitchFamily="49" charset="0"/>
+              </a:rPr>
+              <a:t>();</a:t>
+            </a:r>
+          </a:p>
+          <a:p>
+            <a:pPr marL="0" indent="0">
+              <a:buNone/>
+            </a:pPr>
+            <a:r>
+              <a:rPr lang="pl-PL" dirty="0" smtClean="0">
+                <a:latin typeface="Courier New" panose="02070309020205020404" pitchFamily="49" charset="0"/>
+                <a:cs typeface="Courier New" panose="02070309020205020404" pitchFamily="49" charset="0"/>
+              </a:rPr>
+              <a:t>	</a:t>
+            </a:r>
+            <a:r>
+              <a:rPr lang="pl-PL" dirty="0" err="1" smtClean="0">
+                <a:latin typeface="Courier New" panose="02070309020205020404" pitchFamily="49" charset="0"/>
+                <a:cs typeface="Courier New" panose="02070309020205020404" pitchFamily="49" charset="0"/>
+              </a:rPr>
+              <a:t>dataSource.setDriverClassName</a:t>
+            </a:r>
+            <a:r>
+              <a:rPr lang="pl-PL" dirty="0" smtClean="0">
+                <a:latin typeface="Courier New" panose="02070309020205020404" pitchFamily="49" charset="0"/>
+                <a:cs typeface="Courier New" panose="02070309020205020404" pitchFamily="49" charset="0"/>
+              </a:rPr>
+              <a:t>("</a:t>
+            </a:r>
+            <a:r>
+              <a:rPr lang="pl-PL" dirty="0" err="1" smtClean="0">
+                <a:latin typeface="Courier New" panose="02070309020205020404" pitchFamily="49" charset="0"/>
+                <a:cs typeface="Courier New" panose="02070309020205020404" pitchFamily="49" charset="0"/>
+              </a:rPr>
+              <a:t>org.hsqldb.jdbcDriver</a:t>
+            </a:r>
+            <a:r>
+              <a:rPr lang="pl-PL" dirty="0" smtClean="0">
+                <a:latin typeface="Courier New" panose="02070309020205020404" pitchFamily="49" charset="0"/>
+                <a:cs typeface="Courier New" panose="02070309020205020404" pitchFamily="49" charset="0"/>
+              </a:rPr>
+              <a:t>");</a:t>
+            </a:r>
+          </a:p>
+          <a:p>
+            <a:pPr marL="0" lvl="2" indent="0">
+              <a:spcBef>
+                <a:spcPts val="600"/>
+              </a:spcBef>
+              <a:buNone/>
+            </a:pPr>
+            <a:r>
+              <a:rPr lang="pl-PL" sz="1400" dirty="0" smtClean="0">
+                <a:latin typeface="Courier New" panose="02070309020205020404" pitchFamily="49" charset="0"/>
+                <a:cs typeface="Courier New" panose="02070309020205020404" pitchFamily="49" charset="0"/>
+              </a:rPr>
+              <a:t>	</a:t>
+            </a:r>
+            <a:r>
+              <a:rPr lang="pl-PL" sz="1400" dirty="0" err="1" smtClean="0">
+                <a:latin typeface="Courier New" panose="02070309020205020404" pitchFamily="49" charset="0"/>
+                <a:cs typeface="Courier New" panose="02070309020205020404" pitchFamily="49" charset="0"/>
+              </a:rPr>
+              <a:t>dataSource.setUrl</a:t>
+            </a:r>
+            <a:r>
+              <a:rPr lang="pl-PL" sz="1400" dirty="0" smtClean="0">
+                <a:latin typeface="Courier New" panose="02070309020205020404" pitchFamily="49" charset="0"/>
+                <a:cs typeface="Courier New" panose="02070309020205020404" pitchFamily="49" charset="0"/>
+              </a:rPr>
+              <a:t>("</a:t>
+            </a:r>
+            <a:r>
+              <a:rPr lang="pl-PL" sz="1400" dirty="0" err="1" smtClean="0">
+                <a:latin typeface="Courier New" panose="02070309020205020404" pitchFamily="49" charset="0"/>
+                <a:cs typeface="Courier New" panose="02070309020205020404" pitchFamily="49" charset="0"/>
+              </a:rPr>
+              <a:t>jdbc:hsqldb:hsql</a:t>
+            </a:r>
+            <a:r>
+              <a:rPr lang="pl-PL" sz="1400" dirty="0" smtClean="0">
+                <a:latin typeface="Courier New" panose="02070309020205020404" pitchFamily="49" charset="0"/>
+                <a:cs typeface="Courier New" panose="02070309020205020404" pitchFamily="49" charset="0"/>
+              </a:rPr>
+              <a:t>://</a:t>
+            </a:r>
+            <a:r>
+              <a:rPr lang="pl-PL" sz="1400" dirty="0" smtClean="0">
+                <a:latin typeface="Courier New" panose="02070309020205020404" pitchFamily="49" charset="0"/>
+                <a:cs typeface="Courier New" panose="02070309020205020404" pitchFamily="49" charset="0"/>
+              </a:rPr>
+              <a:t>127.0.0.1:9001/</a:t>
+            </a:r>
+            <a:r>
+              <a:rPr lang="pl-PL" sz="1400" dirty="0" err="1" smtClean="0">
+                <a:latin typeface="Courier New" panose="02070309020205020404" pitchFamily="49" charset="0"/>
+                <a:cs typeface="Courier New" panose="02070309020205020404" pitchFamily="49" charset="0"/>
+              </a:rPr>
+              <a:t>test-db</a:t>
+            </a:r>
+            <a:r>
+              <a:rPr lang="pl-PL" sz="1400" dirty="0" smtClean="0">
+                <a:latin typeface="Courier New" panose="02070309020205020404" pitchFamily="49" charset="0"/>
+                <a:cs typeface="Courier New" panose="02070309020205020404" pitchFamily="49" charset="0"/>
+              </a:rPr>
+              <a:t>");</a:t>
+            </a:r>
+          </a:p>
+          <a:p>
+            <a:pPr marL="0" indent="0">
+              <a:buNone/>
+            </a:pPr>
+            <a:r>
+              <a:rPr lang="pl-PL" dirty="0" smtClean="0">
+                <a:latin typeface="Courier New" panose="02070309020205020404" pitchFamily="49" charset="0"/>
+                <a:cs typeface="Courier New" panose="02070309020205020404" pitchFamily="49" charset="0"/>
+              </a:rPr>
+              <a:t>	</a:t>
+            </a:r>
+            <a:r>
+              <a:rPr lang="pl-PL" dirty="0" err="1" smtClean="0">
+                <a:latin typeface="Courier New" panose="02070309020205020404" pitchFamily="49" charset="0"/>
+                <a:cs typeface="Courier New" panose="02070309020205020404" pitchFamily="49" charset="0"/>
+              </a:rPr>
+              <a:t>dataSource.setUserName</a:t>
+            </a:r>
+            <a:r>
+              <a:rPr lang="pl-PL" dirty="0" smtClean="0">
+                <a:latin typeface="Courier New" panose="02070309020205020404" pitchFamily="49" charset="0"/>
+                <a:cs typeface="Courier New" panose="02070309020205020404" pitchFamily="49" charset="0"/>
+              </a:rPr>
+              <a:t>("SA");</a:t>
+            </a:r>
+          </a:p>
+          <a:p>
+            <a:pPr marL="0" indent="0">
+              <a:buNone/>
+            </a:pPr>
+            <a:r>
+              <a:rPr lang="pl-PL" dirty="0" smtClean="0">
+                <a:latin typeface="Courier New" panose="02070309020205020404" pitchFamily="49" charset="0"/>
+                <a:cs typeface="Courier New" panose="02070309020205020404" pitchFamily="49" charset="0"/>
+              </a:rPr>
+              <a:t>	</a:t>
+            </a:r>
+            <a:r>
+              <a:rPr lang="pl-PL" dirty="0" err="1" smtClean="0">
+                <a:latin typeface="Courier New" panose="02070309020205020404" pitchFamily="49" charset="0"/>
+                <a:cs typeface="Courier New" panose="02070309020205020404" pitchFamily="49" charset="0"/>
+              </a:rPr>
+              <a:t>dataSource.setPassword</a:t>
+            </a:r>
+            <a:r>
+              <a:rPr lang="pl-PL" dirty="0" smtClean="0">
+                <a:latin typeface="Courier New" panose="02070309020205020404" pitchFamily="49" charset="0"/>
+                <a:cs typeface="Courier New" panose="02070309020205020404" pitchFamily="49" charset="0"/>
+              </a:rPr>
+              <a:t>("");</a:t>
+            </a:r>
+          </a:p>
+          <a:p>
+            <a:pPr marL="0" indent="0">
+              <a:buNone/>
+            </a:pPr>
+            <a:endParaRPr lang="pl-PL" dirty="0" smtClean="0">
+              <a:latin typeface="Courier New" panose="02070309020205020404" pitchFamily="49" charset="0"/>
+              <a:cs typeface="Courier New" panose="02070309020205020404" pitchFamily="49" charset="0"/>
+            </a:endParaRPr>
+          </a:p>
+          <a:p>
+            <a:pPr marL="0" indent="0">
+              <a:buNone/>
+            </a:pPr>
+            <a:r>
+              <a:rPr lang="pl-PL" dirty="0" smtClean="0">
+                <a:latin typeface="Courier New" panose="02070309020205020404" pitchFamily="49" charset="0"/>
+                <a:cs typeface="Courier New" panose="02070309020205020404" pitchFamily="49" charset="0"/>
+              </a:rPr>
+              <a:t>	</a:t>
+            </a:r>
+            <a:r>
+              <a:rPr lang="pl-PL" dirty="0" err="1" smtClean="0">
+                <a:latin typeface="Courier New" panose="02070309020205020404" pitchFamily="49" charset="0"/>
+                <a:cs typeface="Courier New" panose="02070309020205020404" pitchFamily="49" charset="0"/>
+              </a:rPr>
+              <a:t>JdbcTemplate</a:t>
+            </a:r>
+            <a:r>
+              <a:rPr lang="pl-PL" dirty="0" smtClean="0">
+                <a:latin typeface="Courier New" panose="02070309020205020404" pitchFamily="49" charset="0"/>
+                <a:cs typeface="Courier New" panose="02070309020205020404" pitchFamily="49" charset="0"/>
+              </a:rPr>
+              <a:t> </a:t>
+            </a:r>
+            <a:r>
+              <a:rPr lang="pl-PL" dirty="0" err="1" smtClean="0">
+                <a:latin typeface="Courier New" panose="02070309020205020404" pitchFamily="49" charset="0"/>
+                <a:cs typeface="Courier New" panose="02070309020205020404" pitchFamily="49" charset="0"/>
+              </a:rPr>
+              <a:t>jdbcTemplate</a:t>
+            </a:r>
+            <a:r>
+              <a:rPr lang="pl-PL" dirty="0" smtClean="0">
+                <a:latin typeface="Courier New" panose="02070309020205020404" pitchFamily="49" charset="0"/>
+                <a:cs typeface="Courier New" panose="02070309020205020404" pitchFamily="49" charset="0"/>
+              </a:rPr>
+              <a:t> = </a:t>
+            </a:r>
+            <a:r>
+              <a:rPr lang="pl-PL" dirty="0" err="1" smtClean="0">
+                <a:latin typeface="Courier New" panose="02070309020205020404" pitchFamily="49" charset="0"/>
+                <a:cs typeface="Courier New" panose="02070309020205020404" pitchFamily="49" charset="0"/>
+              </a:rPr>
+              <a:t>new</a:t>
+            </a:r>
+            <a:r>
+              <a:rPr lang="pl-PL" dirty="0" smtClean="0">
+                <a:latin typeface="Courier New" panose="02070309020205020404" pitchFamily="49" charset="0"/>
+                <a:cs typeface="Courier New" panose="02070309020205020404" pitchFamily="49" charset="0"/>
+              </a:rPr>
+              <a:t> </a:t>
+            </a:r>
+            <a:r>
+              <a:rPr lang="pl-PL" dirty="0" err="1" smtClean="0">
+                <a:latin typeface="Courier New" panose="02070309020205020404" pitchFamily="49" charset="0"/>
+                <a:cs typeface="Courier New" panose="02070309020205020404" pitchFamily="49" charset="0"/>
+              </a:rPr>
+              <a:t>JdbcTemplate</a:t>
+            </a:r>
+            <a:r>
+              <a:rPr lang="pl-PL" dirty="0" smtClean="0">
+                <a:latin typeface="Courier New" panose="02070309020205020404" pitchFamily="49" charset="0"/>
+                <a:cs typeface="Courier New" panose="02070309020205020404" pitchFamily="49" charset="0"/>
+              </a:rPr>
+              <a:t>(</a:t>
+            </a:r>
+            <a:r>
+              <a:rPr lang="pl-PL" dirty="0" err="1" smtClean="0">
+                <a:latin typeface="Courier New" panose="02070309020205020404" pitchFamily="49" charset="0"/>
+                <a:cs typeface="Courier New" panose="02070309020205020404" pitchFamily="49" charset="0"/>
+              </a:rPr>
+              <a:t>datasource</a:t>
+            </a:r>
+            <a:r>
+              <a:rPr lang="pl-PL" dirty="0" smtClean="0">
+                <a:latin typeface="Courier New" panose="02070309020205020404" pitchFamily="49" charset="0"/>
+                <a:cs typeface="Courier New" panose="02070309020205020404" pitchFamily="49" charset="0"/>
+              </a:rPr>
+              <a:t>);</a:t>
+            </a:r>
+          </a:p>
+          <a:p>
+            <a:pPr marL="0" indent="0">
+              <a:buNone/>
+            </a:pPr>
+            <a:endParaRPr lang="pl-PL" dirty="0" smtClean="0">
+              <a:latin typeface="Courier New" panose="02070309020205020404" pitchFamily="49" charset="0"/>
+              <a:cs typeface="Courier New" panose="02070309020205020404" pitchFamily="49" charset="0"/>
+            </a:endParaRPr>
+          </a:p>
+          <a:p>
+            <a:pPr marL="0" indent="0">
+              <a:buNone/>
+            </a:pPr>
+            <a:r>
+              <a:rPr lang="pl-PL" dirty="0" smtClean="0">
+                <a:latin typeface="Courier New" panose="02070309020205020404" pitchFamily="49" charset="0"/>
+                <a:cs typeface="Courier New" panose="02070309020205020404" pitchFamily="49" charset="0"/>
+              </a:rPr>
+              <a:t>	</a:t>
+            </a:r>
+            <a:r>
+              <a:rPr lang="pl-PL" dirty="0" err="1" smtClean="0">
+                <a:latin typeface="Courier New" panose="02070309020205020404" pitchFamily="49" charset="0"/>
+                <a:cs typeface="Courier New" panose="02070309020205020404" pitchFamily="49" charset="0"/>
+              </a:rPr>
+              <a:t>jdbcTemplate.execute</a:t>
+            </a:r>
+            <a:r>
+              <a:rPr lang="pl-PL" dirty="0" smtClean="0">
+                <a:latin typeface="Courier New" panose="02070309020205020404" pitchFamily="49" charset="0"/>
+                <a:cs typeface="Courier New" panose="02070309020205020404" pitchFamily="49" charset="0"/>
+              </a:rPr>
+              <a:t>("CREATE TABLE Trade </a:t>
+            </a:r>
+            <a:r>
+              <a:rPr lang="en-US" dirty="0" smtClean="0">
+                <a:latin typeface="Courier New" panose="02070309020205020404" pitchFamily="49" charset="0"/>
+                <a:cs typeface="Courier New" panose="02070309020205020404" pitchFamily="49" charset="0"/>
+              </a:rPr>
+              <a:t>(id </a:t>
+            </a:r>
+            <a:r>
+              <a:rPr lang="en-US" dirty="0" smtClean="0">
+                <a:latin typeface="Courier New" panose="02070309020205020404" pitchFamily="49" charset="0"/>
+                <a:cs typeface="Courier New" panose="02070309020205020404" pitchFamily="49" charset="0"/>
+              </a:rPr>
+              <a:t>IDENTITY PRIMARY KEY </a:t>
+            </a:r>
+            <a:r>
+              <a:rPr lang="pl-PL" dirty="0" smtClean="0">
+                <a:latin typeface="Courier New" panose="02070309020205020404" pitchFamily="49" charset="0"/>
+                <a:cs typeface="Courier New" panose="02070309020205020404" pitchFamily="49" charset="0"/>
+              </a:rPr>
+              <a:t>	</a:t>
+            </a:r>
+            <a:r>
+              <a:rPr lang="en-US" dirty="0" smtClean="0">
+                <a:latin typeface="Courier New" panose="02070309020205020404" pitchFamily="49" charset="0"/>
+                <a:cs typeface="Courier New" panose="02070309020205020404" pitchFamily="49" charset="0"/>
+              </a:rPr>
+              <a:t>,asset </a:t>
+            </a:r>
+            <a:r>
+              <a:rPr lang="pl-PL" dirty="0" smtClean="0">
+                <a:latin typeface="Courier New" panose="02070309020205020404" pitchFamily="49" charset="0"/>
+                <a:cs typeface="Courier New" panose="02070309020205020404" pitchFamily="49" charset="0"/>
+              </a:rPr>
+              <a:t>V</a:t>
+            </a:r>
+            <a:r>
+              <a:rPr lang="en-US" dirty="0" smtClean="0">
+                <a:latin typeface="Courier New" panose="02070309020205020404" pitchFamily="49" charset="0"/>
+                <a:cs typeface="Courier New" panose="02070309020205020404" pitchFamily="49" charset="0"/>
+              </a:rPr>
+              <a:t>ARCHAR(50),</a:t>
+            </a:r>
+            <a:r>
+              <a:rPr lang="pl-PL" dirty="0" smtClean="0">
+                <a:latin typeface="Courier New" panose="02070309020205020404" pitchFamily="49" charset="0"/>
+                <a:cs typeface="Courier New" panose="02070309020205020404" pitchFamily="49" charset="0"/>
+              </a:rPr>
+              <a:t> </a:t>
+            </a:r>
+            <a:r>
+              <a:rPr lang="en-US" dirty="0" smtClean="0">
+                <a:latin typeface="Courier New" panose="02070309020205020404" pitchFamily="49" charset="0"/>
+                <a:cs typeface="Courier New" panose="02070309020205020404" pitchFamily="49" charset="0"/>
+              </a:rPr>
+              <a:t>amount DOUBLE,</a:t>
+            </a:r>
+            <a:r>
+              <a:rPr lang="pl-PL" dirty="0" smtClean="0">
+                <a:latin typeface="Courier New" panose="02070309020205020404" pitchFamily="49" charset="0"/>
+                <a:cs typeface="Courier New" panose="02070309020205020404" pitchFamily="49" charset="0"/>
+              </a:rPr>
+              <a:t> </a:t>
+            </a:r>
+            <a:r>
+              <a:rPr lang="en-US" dirty="0" smtClean="0">
+                <a:latin typeface="Courier New" panose="02070309020205020404" pitchFamily="49" charset="0"/>
+                <a:cs typeface="Courier New" panose="02070309020205020404" pitchFamily="49" charset="0"/>
+              </a:rPr>
+              <a:t>date </a:t>
+            </a:r>
+            <a:r>
+              <a:rPr lang="en-US" dirty="0" err="1" smtClean="0">
+                <a:latin typeface="Courier New" panose="02070309020205020404" pitchFamily="49" charset="0"/>
+                <a:cs typeface="Courier New" panose="02070309020205020404" pitchFamily="49" charset="0"/>
+              </a:rPr>
+              <a:t>DATE</a:t>
+            </a:r>
+            <a:r>
+              <a:rPr lang="en-US" dirty="0" smtClean="0">
+                <a:latin typeface="Courier New" panose="02070309020205020404" pitchFamily="49" charset="0"/>
+                <a:cs typeface="Courier New" panose="02070309020205020404" pitchFamily="49" charset="0"/>
+              </a:rPr>
+              <a:t>);</a:t>
+            </a:r>
+            <a:r>
+              <a:rPr lang="pl-PL" dirty="0" smtClean="0">
+                <a:latin typeface="Courier New" panose="02070309020205020404" pitchFamily="49" charset="0"/>
+                <a:cs typeface="Courier New" panose="02070309020205020404" pitchFamily="49" charset="0"/>
+              </a:rPr>
+              <a:t>");</a:t>
+            </a:r>
+          </a:p>
+          <a:p>
+            <a:pPr marL="0" indent="0">
+              <a:buNone/>
+            </a:pPr>
+            <a:r>
+              <a:rPr lang="pl-PL" dirty="0" smtClean="0">
+                <a:latin typeface="Courier New" panose="02070309020205020404" pitchFamily="49" charset="0"/>
+                <a:cs typeface="Courier New" panose="02070309020205020404" pitchFamily="49" charset="0"/>
+              </a:rPr>
+              <a:t>// ...</a:t>
+            </a:r>
+            <a:endParaRPr lang="pl-PL" dirty="0" smtClean="0">
+              <a:latin typeface="Courier New" panose="02070309020205020404" pitchFamily="49" charset="0"/>
+              <a:cs typeface="Courier New" panose="02070309020205020404" pitchFamily="49" charset="0"/>
+            </a:endParaRPr>
+          </a:p>
+        </p:txBody>
+      </p:sp>
+    </p:spTree>
+    <p:extLst>
+      <p:ext uri="{BB962C8B-B14F-4D97-AF65-F5344CB8AC3E}">
+        <p14:creationId xmlns:p14="http://schemas.microsoft.com/office/powerpoint/2010/main" xmlns="" val="3199221210"/>
+      </p:ext>
+    </p:extLst>
+  </p:cSld>
+  <p:clrMapOvr>
+    <a:masterClrMapping/>
+  </p:clrMapOvr>
+  <mc:AlternateContent xmlns:mc="http://schemas.openxmlformats.org/markup-compatibility/2006">
+    <mc:Choice xmlns:p14="http://schemas.microsoft.com/office/powerpoint/2010/main" xmlns="" Requires="p14">
+      <p:transition p14:dur="10"/>
+    </mc:Choice>
+    <mc:Fallback>
+      <p:transition/>
+    </mc:Fallback>
+  </mc:AlternateContent>
+  <p:timing>
+    <p:tnLst>
+      <p:par>
+        <p:cTn id="1" dur="indefinite" restart="never" nodeType="tmRoot"/>
+      </p:par>
+    </p:tnLst>
+  </p:timing>
+</p:sld>
+</file>
+
+<file path=ppt/slides/slide26.xml><?xml version="1.0" encoding="utf-8"?>
+<p:sld xmlns:a="http://schemas.openxmlformats.org/drawingml/2006/main" xmlns:r="http://schemas.openxmlformats.org/officeDocument/2006/relationships" xmlns:p="http://schemas.openxmlformats.org/presentationml/2006/main">
+  <p:cSld>
+    <p:spTree>
+      <p:nvGrpSpPr>
+        <p:cNvPr id="1" name=""/>
+        <p:cNvGrpSpPr/>
+        <p:nvPr/>
+      </p:nvGrpSpPr>
+      <p:grpSpPr>
+        <a:xfrm>
+          <a:off x="0" y="0"/>
+          <a:ext cx="0" cy="0"/>
+          <a:chOff x="0" y="0"/>
+          <a:chExt cx="0" cy="0"/>
+        </a:xfrm>
+      </p:grpSpPr>
+      <p:sp>
+        <p:nvSpPr>
+          <p:cNvPr id="7" name="Titel 6"/>
+          <p:cNvSpPr>
+            <a:spLocks noGrp="1"/>
+          </p:cNvSpPr>
+          <p:nvPr>
+            <p:ph type="title"/>
+          </p:nvPr>
+        </p:nvSpPr>
+        <p:spPr/>
+        <p:txBody>
+          <a:bodyPr/>
+          <a:lstStyle/>
+          <a:p>
+            <a:r>
+              <a:rPr lang="pl-PL" dirty="0" smtClean="0"/>
+              <a:t>Opis ćwiczenia</a:t>
+            </a:r>
+            <a:endParaRPr lang="de-DE" dirty="0"/>
+          </a:p>
+        </p:txBody>
+      </p:sp>
+      <p:sp>
+        <p:nvSpPr>
+          <p:cNvPr id="5" name="Inhaltsplatzhalter 4"/>
+          <p:cNvSpPr>
+            <a:spLocks noGrp="1"/>
+          </p:cNvSpPr>
+          <p:nvPr>
+            <p:ph type="body" sz="quarter" idx="13"/>
+          </p:nvPr>
+        </p:nvSpPr>
+        <p:spPr/>
+        <p:txBody>
+          <a:bodyPr/>
+          <a:lstStyle/>
+          <a:p>
+            <a:r>
+              <a:rPr lang="pl-PL" dirty="0" smtClean="0"/>
+              <a:t>ĆWICZENIE 5</a:t>
+            </a:r>
+            <a:endParaRPr lang="de-DE" dirty="0"/>
+          </a:p>
+        </p:txBody>
+      </p:sp>
+      <p:sp>
+        <p:nvSpPr>
+          <p:cNvPr id="6" name="Symbol zastępczy zawartości 1"/>
+          <p:cNvSpPr>
+            <a:spLocks noGrp="1"/>
+          </p:cNvSpPr>
+          <p:nvPr>
+            <p:ph idx="1"/>
+          </p:nvPr>
+        </p:nvSpPr>
+        <p:spPr>
+          <a:xfrm>
+            <a:off x="443707" y="1119187"/>
+            <a:ext cx="8023887" cy="3362325"/>
+          </a:xfrm>
+        </p:spPr>
+        <p:txBody>
+          <a:bodyPr>
+            <a:normAutofit/>
+          </a:bodyPr>
+          <a:lstStyle/>
+          <a:p>
+            <a:r>
+              <a:rPr lang="pl-PL" dirty="0"/>
+              <a:t>Repozytorium:</a:t>
+            </a:r>
+          </a:p>
+          <a:p>
+            <a:pPr lvl="1"/>
+            <a:r>
+              <a:rPr lang="pl-PL" dirty="0" smtClean="0">
+                <a:hlinkClick r:id="rId3"/>
+              </a:rPr>
+              <a:t>https://github.com/m-kolodziejski/exercise5</a:t>
+            </a:r>
+            <a:endParaRPr lang="pl-PL" dirty="0" smtClean="0"/>
+          </a:p>
+          <a:p>
+            <a:endParaRPr lang="pl-PL" dirty="0" smtClean="0"/>
+          </a:p>
+          <a:p>
+            <a:r>
+              <a:rPr lang="pl-PL" dirty="0" smtClean="0"/>
+              <a:t>W </a:t>
+            </a:r>
+            <a:r>
+              <a:rPr lang="pl-PL" dirty="0" err="1" smtClean="0"/>
+              <a:t>branchu</a:t>
+            </a:r>
+            <a:r>
+              <a:rPr lang="pl-PL" dirty="0" smtClean="0"/>
+              <a:t> (</a:t>
+            </a:r>
+            <a:r>
+              <a:rPr lang="pl-PL" dirty="0" err="1" smtClean="0"/>
+              <a:t>jdbcTemplate</a:t>
+            </a:r>
+            <a:r>
+              <a:rPr lang="pl-PL" dirty="0" smtClean="0"/>
+              <a:t>) znajduje się zestaw testów jednostkowych oraz klasa z metodami do zaimplementowanie z użyciem </a:t>
+            </a:r>
+            <a:r>
+              <a:rPr lang="pl-PL" dirty="0" err="1" smtClean="0"/>
+              <a:t>JdbcTemplate</a:t>
+            </a:r>
+            <a:r>
+              <a:rPr lang="pl-PL" dirty="0" smtClean="0"/>
+              <a:t>.</a:t>
+            </a:r>
+          </a:p>
+          <a:p>
+            <a:pPr lvl="1"/>
+            <a:r>
+              <a:rPr lang="pl-PL" dirty="0" smtClean="0"/>
+              <a:t>Po uruchomieniu testów (</a:t>
+            </a:r>
+            <a:r>
+              <a:rPr lang="pl-PL" dirty="0" err="1" smtClean="0"/>
+              <a:t>gradlew</a:t>
+            </a:r>
+            <a:r>
+              <a:rPr lang="pl-PL" dirty="0" smtClean="0"/>
+              <a:t> test) zostanie utworzona baza danych HSQL typu </a:t>
+            </a:r>
+            <a:r>
+              <a:rPr lang="pl-PL" b="1" dirty="0" err="1" smtClean="0"/>
+              <a:t>embedded</a:t>
+            </a:r>
+            <a:endParaRPr lang="pl-PL" b="1" dirty="0" smtClean="0"/>
+          </a:p>
+          <a:p>
+            <a:r>
+              <a:rPr lang="pl-PL" dirty="0" smtClean="0"/>
+              <a:t>Zaimplementuj metody klasy wdsr\exercise5\dao\TradeDao.java aby testy jednostkowe przechodziły pozytywnie.</a:t>
+            </a:r>
+          </a:p>
+          <a:p>
+            <a:pPr lvl="1"/>
+            <a:r>
+              <a:rPr lang="pl-PL" dirty="0" smtClean="0"/>
+              <a:t>Wykorzystaj przekazany do klasy przy pomocy adnotacji @</a:t>
+            </a:r>
+            <a:r>
+              <a:rPr lang="pl-PL" dirty="0" err="1" smtClean="0"/>
+              <a:t>Autowired</a:t>
+            </a:r>
+            <a:r>
+              <a:rPr lang="pl-PL" dirty="0" smtClean="0"/>
+              <a:t> obiekt </a:t>
+            </a:r>
+            <a:r>
+              <a:rPr lang="pl-PL" dirty="0" err="1" smtClean="0"/>
+              <a:t>JdbcTemplate</a:t>
+            </a:r>
+            <a:r>
+              <a:rPr lang="pl-PL" dirty="0" smtClean="0"/>
+              <a:t>.</a:t>
+            </a:r>
+          </a:p>
+          <a:p>
+            <a:pPr lvl="1"/>
+            <a:r>
+              <a:rPr lang="pl-PL" dirty="0" smtClean="0"/>
+              <a:t>Strukturę bazy znajdziesz w pliku /test/resources/</a:t>
+            </a:r>
+            <a:r>
+              <a:rPr lang="pl-PL" dirty="0" err="1" smtClean="0"/>
+              <a:t>embedded_db</a:t>
+            </a:r>
+            <a:r>
+              <a:rPr lang="pl-PL" dirty="0" smtClean="0"/>
+              <a:t>/</a:t>
+            </a:r>
+            <a:r>
+              <a:rPr lang="pl-PL" dirty="0" err="1" smtClean="0"/>
+              <a:t>create-db.sql</a:t>
+            </a:r>
+            <a:endParaRPr lang="pl-PL" dirty="0" smtClean="0"/>
+          </a:p>
+          <a:p>
+            <a:pPr lvl="1"/>
+            <a:r>
+              <a:rPr lang="pl-PL" dirty="0" smtClean="0"/>
+              <a:t>Początkową zawartość bazy danych znajdziesz w pliku /test/resources/</a:t>
+            </a:r>
+            <a:r>
+              <a:rPr lang="pl-PL" dirty="0" err="1" smtClean="0"/>
+              <a:t>embedded_db</a:t>
+            </a:r>
+            <a:r>
+              <a:rPr lang="pl-PL" dirty="0" smtClean="0"/>
+              <a:t>/</a:t>
+            </a:r>
+            <a:r>
+              <a:rPr lang="pl-PL" dirty="0" err="1" smtClean="0"/>
+              <a:t>insert-data.sql</a:t>
+            </a:r>
+            <a:endParaRPr lang="pl-PL" dirty="0" smtClean="0"/>
+          </a:p>
+          <a:p>
+            <a:pPr lvl="1"/>
+            <a:endParaRPr lang="pl-PL" dirty="0"/>
+          </a:p>
+        </p:txBody>
+      </p:sp>
+      <p:sp>
+        <p:nvSpPr>
+          <p:cNvPr id="8" name="pole tekstowe 7"/>
+          <p:cNvSpPr txBox="1"/>
+          <p:nvPr/>
+        </p:nvSpPr>
+        <p:spPr bwMode="auto">
+          <a:xfrm>
+            <a:off x="443707" y="4337616"/>
+            <a:ext cx="6751848" cy="518091"/>
+          </a:xfrm>
+          <a:prstGeom prst="rect">
+            <a:avLst/>
+          </a:prstGeom>
+          <a:noFill/>
+          <a:ln w="9525">
+            <a:noFill/>
+            <a:miter lim="800000"/>
+            <a:headEnd/>
+            <a:tailEnd/>
+          </a:ln>
+        </p:spPr>
+        <p:txBody>
+          <a:bodyPr wrap="none" lIns="0" tIns="0" rIns="0" bIns="0" rtlCol="0">
+            <a:spAutoFit/>
+          </a:bodyPr>
+          <a:lstStyle/>
+          <a:p>
+            <a:pPr>
+              <a:spcBef>
+                <a:spcPts val="100"/>
+              </a:spcBef>
+              <a:spcAft>
+                <a:spcPts val="100"/>
+              </a:spcAft>
+            </a:pPr>
+            <a:r>
+              <a:rPr lang="pl-PL" sz="1600" b="1" dirty="0" smtClean="0">
+                <a:solidFill>
+                  <a:srgbClr val="00B050"/>
+                </a:solidFill>
+              </a:rPr>
+              <a:t>Ostateczny termin zaliczenia ćwiczenia: wtorek 30 maja</a:t>
+            </a:r>
+          </a:p>
+          <a:p>
+            <a:pPr>
+              <a:spcBef>
+                <a:spcPts val="100"/>
+              </a:spcBef>
+              <a:spcAft>
+                <a:spcPts val="100"/>
+              </a:spcAft>
+            </a:pPr>
+            <a:r>
+              <a:rPr lang="pl-PL" sz="1600" b="1" dirty="0" smtClean="0">
+                <a:solidFill>
+                  <a:srgbClr val="00B050"/>
+                </a:solidFill>
+              </a:rPr>
+              <a:t>Rozwiązania dostarczone później nie będą uwzględniane (0 punktów)</a:t>
+            </a:r>
+            <a:endParaRPr lang="pl-PL" sz="1600" b="1" dirty="0">
+              <a:solidFill>
+                <a:srgbClr val="00B050"/>
+              </a:solidFill>
+            </a:endParaRPr>
+          </a:p>
+        </p:txBody>
+      </p:sp>
+    </p:spTree>
+    <p:extLst>
+      <p:ext uri="{BB962C8B-B14F-4D97-AF65-F5344CB8AC3E}">
+        <p14:creationId xmlns:p14="http://schemas.microsoft.com/office/powerpoint/2010/main" xmlns="" val="3199221210"/>
+      </p:ext>
+    </p:extLst>
+  </p:cSld>
+  <p:clrMapOvr>
+    <a:masterClrMapping/>
+  </p:clrMapOvr>
+  <mc:AlternateContent xmlns:mc="http://schemas.openxmlformats.org/markup-compatibility/2006">
+    <mc:Choice xmlns:p14="http://schemas.microsoft.com/office/powerpoint/2010/main" xmlns="" Requires="p14">
+      <p:transition p14:dur="10"/>
+    </mc:Choice>
+    <mc:Fallback>
+      <p:transition/>
+    </mc:Fallback>
+  </mc:AlternateContent>
+  <p:timing>
+    <p:tnLst>
+      <p:par>
+        <p:cTn id="1" dur="indefinite" restart="never" nodeType="tmRoot">
+          <p:childTnLst>
+            <p:seq concurrent="1" nextAc="seek">
+              <p:cTn id="2" dur="indefinite" nodeType="mainSeq">
+                <p:childTnLst>
+                  <p:par>
+                    <p:cTn id="3" fill="hold">
+                      <p:stCondLst>
+                        <p:cond delay="indefinite"/>
+                      </p:stCondLst>
+                      <p:childTnLst>
+                        <p:par>
+                          <p:cTn id="4" fill="hold">
+                            <p:stCondLst>
+                              <p:cond delay="0"/>
+                            </p:stCondLst>
+                            <p:childTnLst>
+                              <p:par>
+                                <p:cTn id="5" presetID="1" presetClass="entr" presetSubtype="0" fill="hold" nodeType="clickEffect">
+                                  <p:stCondLst>
+                                    <p:cond delay="0"/>
+                                  </p:stCondLst>
+                                  <p:childTnLst>
+                                    <p:set>
+                                      <p:cBhvr>
+                                        <p:cTn id="6" dur="1" fill="hold">
+                                          <p:stCondLst>
+                                            <p:cond delay="0"/>
+                                          </p:stCondLst>
+                                        </p:cTn>
+                                        <p:tgtEl>
+                                          <p:spTgt spid="6">
+                                            <p:txEl>
+                                              <p:pRg st="0" end="0"/>
+                                            </p:txEl>
+                                          </p:spTgt>
+                                        </p:tgtEl>
+                                        <p:attrNameLst>
+                                          <p:attrName>style.visibility</p:attrName>
+                                        </p:attrNameLst>
+                                      </p:cBhvr>
+                                      <p:to>
+                                        <p:strVal val="visible"/>
+                                      </p:to>
+                                    </p:set>
+                                  </p:childTnLst>
+                                </p:cTn>
+                              </p:par>
+                            </p:childTnLst>
+                          </p:cTn>
+                        </p:par>
+                      </p:childTnLst>
+                    </p:cTn>
+                  </p:par>
+                  <p:par>
+                    <p:cTn id="7" fill="hold">
+                      <p:stCondLst>
+                        <p:cond delay="indefinite"/>
+                      </p:stCondLst>
+                      <p:childTnLst>
+                        <p:par>
+                          <p:cTn id="8" fill="hold">
+                            <p:stCondLst>
+                              <p:cond delay="0"/>
+                            </p:stCondLst>
+                            <p:childTnLst>
+                              <p:par>
+                                <p:cTn id="9" presetID="1" presetClass="entr" presetSubtype="0" fill="hold" nodeType="clickEffect">
+                                  <p:stCondLst>
+                                    <p:cond delay="0"/>
+                                  </p:stCondLst>
+                                  <p:childTnLst>
+                                    <p:set>
+                                      <p:cBhvr>
+                                        <p:cTn id="10" dur="1" fill="hold">
+                                          <p:stCondLst>
+                                            <p:cond delay="0"/>
+                                          </p:stCondLst>
+                                        </p:cTn>
+                                        <p:tgtEl>
+                                          <p:spTgt spid="6">
+                                            <p:txEl>
+                                              <p:pRg st="1" end="1"/>
+                                            </p:txEl>
+                                          </p:spTgt>
+                                        </p:tgtEl>
+                                        <p:attrNameLst>
+                                          <p:attrName>style.visibility</p:attrName>
+                                        </p:attrNameLst>
+                                      </p:cBhvr>
+                                      <p:to>
+                                        <p:strVal val="visible"/>
+                                      </p:to>
+                                    </p:set>
+                                  </p:childTnLst>
+                                </p:cTn>
+                              </p:par>
+                            </p:childTnLst>
+                          </p:cTn>
+                        </p:par>
+                      </p:childTnLst>
+                    </p:cTn>
+                  </p:par>
+                  <p:par>
+                    <p:cTn id="11" fill="hold">
+                      <p:stCondLst>
+                        <p:cond delay="indefinite"/>
+                      </p:stCondLst>
+                      <p:childTnLst>
+                        <p:par>
+                          <p:cTn id="12" fill="hold">
+                            <p:stCondLst>
+                              <p:cond delay="0"/>
+                            </p:stCondLst>
+                            <p:childTnLst>
+                              <p:par>
+                                <p:cTn id="13" presetID="1" presetClass="entr" presetSubtype="0" fill="hold" nodeType="clickEffect">
+                                  <p:stCondLst>
+                                    <p:cond delay="0"/>
+                                  </p:stCondLst>
+                                  <p:childTnLst>
+                                    <p:set>
+                                      <p:cBhvr>
+                                        <p:cTn id="14" dur="1" fill="hold">
+                                          <p:stCondLst>
+                                            <p:cond delay="0"/>
+                                          </p:stCondLst>
+                                        </p:cTn>
+                                        <p:tgtEl>
+                                          <p:spTgt spid="6">
+                                            <p:txEl>
+                                              <p:pRg st="3" end="3"/>
+                                            </p:txEl>
+                                          </p:spTgt>
+                                        </p:tgtEl>
+                                        <p:attrNameLst>
+                                          <p:attrName>style.visibility</p:attrName>
+                                        </p:attrNameLst>
+                                      </p:cBhvr>
+                                      <p:to>
+                                        <p:strVal val="visible"/>
+                                      </p:to>
+                                    </p:set>
+                                  </p:childTnLst>
+                                </p:cTn>
+                              </p:par>
+                              <p:par>
+                                <p:cTn id="15" presetID="1" presetClass="entr" presetSubtype="0" fill="hold" nodeType="withEffect">
+                                  <p:stCondLst>
+                                    <p:cond delay="0"/>
+                                  </p:stCondLst>
+                                  <p:childTnLst>
+                                    <p:set>
+                                      <p:cBhvr>
+                                        <p:cTn id="16" dur="1" fill="hold">
+                                          <p:stCondLst>
+                                            <p:cond delay="0"/>
+                                          </p:stCondLst>
+                                        </p:cTn>
+                                        <p:tgtEl>
+                                          <p:spTgt spid="6">
+                                            <p:txEl>
+                                              <p:pRg st="4" end="4"/>
+                                            </p:txEl>
+                                          </p:spTgt>
+                                        </p:tgtEl>
+                                        <p:attrNameLst>
+                                          <p:attrName>style.visibility</p:attrName>
+                                        </p:attrNameLst>
+                                      </p:cBhvr>
+                                      <p:to>
+                                        <p:strVal val="visible"/>
+                                      </p:to>
+                                    </p:set>
+                                  </p:childTnLst>
+                                </p:cTn>
+                              </p:par>
+                              <p:par>
+                                <p:cTn id="17" presetID="1" presetClass="entr" presetSubtype="0" fill="hold" nodeType="withEffect">
+                                  <p:stCondLst>
+                                    <p:cond delay="0"/>
+                                  </p:stCondLst>
+                                  <p:childTnLst>
+                                    <p:set>
+                                      <p:cBhvr>
+                                        <p:cTn id="18" dur="1" fill="hold">
+                                          <p:stCondLst>
+                                            <p:cond delay="0"/>
+                                          </p:stCondLst>
+                                        </p:cTn>
+                                        <p:tgtEl>
+                                          <p:spTgt spid="6">
+                                            <p:txEl>
+                                              <p:pRg st="5" end="5"/>
+                                            </p:txEl>
+                                          </p:spTgt>
+                                        </p:tgtEl>
+                                        <p:attrNameLst>
+                                          <p:attrName>style.visibility</p:attrName>
+                                        </p:attrNameLst>
+                                      </p:cBhvr>
+                                      <p:to>
+                                        <p:strVal val="visible"/>
+                                      </p:to>
+                                    </p:set>
+                                  </p:childTnLst>
+                                </p:cTn>
+                              </p:par>
+                              <p:par>
+                                <p:cTn id="19" presetID="1" presetClass="entr" presetSubtype="0" fill="hold" nodeType="withEffect">
+                                  <p:stCondLst>
+                                    <p:cond delay="0"/>
+                                  </p:stCondLst>
+                                  <p:childTnLst>
+                                    <p:set>
+                                      <p:cBhvr>
+                                        <p:cTn id="20" dur="1" fill="hold">
+                                          <p:stCondLst>
+                                            <p:cond delay="0"/>
+                                          </p:stCondLst>
+                                        </p:cTn>
+                                        <p:tgtEl>
+                                          <p:spTgt spid="6">
+                                            <p:txEl>
+                                              <p:pRg st="6" end="6"/>
+                                            </p:txEl>
+                                          </p:spTgt>
+                                        </p:tgtEl>
+                                        <p:attrNameLst>
+                                          <p:attrName>style.visibility</p:attrName>
+                                        </p:attrNameLst>
+                                      </p:cBhvr>
+                                      <p:to>
+                                        <p:strVal val="visible"/>
+                                      </p:to>
+                                    </p:set>
+                                  </p:childTnLst>
+                                </p:cTn>
+                              </p:par>
+                              <p:par>
+                                <p:cTn id="21" presetID="1" presetClass="entr" presetSubtype="0" fill="hold" nodeType="withEffect">
+                                  <p:stCondLst>
+                                    <p:cond delay="0"/>
+                                  </p:stCondLst>
+                                  <p:childTnLst>
+                                    <p:set>
+                                      <p:cBhvr>
+                                        <p:cTn id="22" dur="1" fill="hold">
+                                          <p:stCondLst>
+                                            <p:cond delay="0"/>
+                                          </p:stCondLst>
+                                        </p:cTn>
+                                        <p:tgtEl>
+                                          <p:spTgt spid="6">
+                                            <p:txEl>
+                                              <p:pRg st="7" end="7"/>
+                                            </p:txEl>
+                                          </p:spTgt>
+                                        </p:tgtEl>
+                                        <p:attrNameLst>
+                                          <p:attrName>style.visibility</p:attrName>
+                                        </p:attrNameLst>
+                                      </p:cBhvr>
+                                      <p:to>
+                                        <p:strVal val="visible"/>
+                                      </p:to>
+                                    </p:set>
+                                  </p:childTnLst>
+                                </p:cTn>
+                              </p:par>
+                              <p:par>
+                                <p:cTn id="23" presetID="1" presetClass="entr" presetSubtype="0" fill="hold" nodeType="withEffect">
+                                  <p:stCondLst>
+                                    <p:cond delay="0"/>
+                                  </p:stCondLst>
+                                  <p:childTnLst>
+                                    <p:set>
+                                      <p:cBhvr>
+                                        <p:cTn id="24" dur="1" fill="hold">
+                                          <p:stCondLst>
+                                            <p:cond delay="0"/>
+                                          </p:stCondLst>
+                                        </p:cTn>
+                                        <p:tgtEl>
+                                          <p:spTgt spid="6">
+                                            <p:txEl>
+                                              <p:pRg st="8" end="8"/>
+                                            </p:txEl>
+                                          </p:spTgt>
+                                        </p:tgtEl>
+                                        <p:attrNameLst>
+                                          <p:attrName>style.visibility</p:attrName>
+                                        </p:attrNameLst>
+                                      </p:cBhvr>
+                                      <p:to>
+                                        <p:strVal val="visible"/>
+                                      </p:to>
+                                    </p:set>
+                                  </p:childTnLst>
+                                </p:cTn>
+                              </p:par>
+                            </p:childTnLst>
+                          </p:cTn>
+                        </p:par>
+                      </p:childTnLst>
+                    </p:cTn>
+                  </p:par>
+                </p:childTnLst>
+              </p:cTn>
+              <p:prevCondLst>
+                <p:cond evt="onPrev" delay="0">
+                  <p:tgtEl>
+                    <p:sldTgt/>
+                  </p:tgtEl>
+                </p:cond>
+              </p:prevCondLst>
+              <p:nextCondLst>
+                <p:cond evt="onNext" delay="0">
+                  <p:tgtEl>
+                    <p:sldTgt/>
+                  </p:tgtEl>
+                </p:cond>
+              </p:nextCondLst>
+            </p:seq>
+          </p:childTnLst>
+        </p:cTn>
+      </p:par>
+    </p:tnLst>
+  </p:timing>
+</p:sld>
+</file>
+
+<file path=ppt/slides/slide27.xml><?xml version="1.0" encoding="utf-8"?>
 <p:sld xmlns:a="http://schemas.openxmlformats.org/drawingml/2006/main" xmlns:r="http://schemas.openxmlformats.org/officeDocument/2006/relationships" xmlns:p="http://schemas.openxmlformats.org/presentationml/2006/main">
   <p:cSld>
     <p:spTree>

</xml_diff>